<commit_message>
On continue les LP électromag
</commit_message>
<xml_diff>
--- a/Leçons/diapo/LP12.pptx
+++ b/Leçons/diapo/LP12.pptx
@@ -8,8 +8,14 @@
     <p:sldId id="264" r:id="rId2"/>
     <p:sldId id="265" r:id="rId3"/>
     <p:sldId id="266" r:id="rId4"/>
-    <p:sldId id="267" r:id="rId5"/>
-    <p:sldId id="268" r:id="rId6"/>
+    <p:sldId id="269" r:id="rId5"/>
+    <p:sldId id="267" r:id="rId6"/>
+    <p:sldId id="270" r:id="rId7"/>
+    <p:sldId id="271" r:id="rId8"/>
+    <p:sldId id="272" r:id="rId9"/>
+    <p:sldId id="273" r:id="rId10"/>
+    <p:sldId id="274" r:id="rId11"/>
+    <p:sldId id="268" r:id="rId12"/>
   </p:sldIdLst>
   <p:sldSz cx="12192000" cy="6858000"/>
   <p:notesSz cx="6858000" cy="9144000"/>
@@ -247,7 +253,7 @@
           <a:p>
             <a:fld id="{C262451B-073C-4FAC-8D0B-6648421A7945}" type="datetimeFigureOut">
               <a:rPr lang="fr-FR" smtClean="0"/>
-              <a:t>04/04/2020</a:t>
+              <a:t>06/04/2020</a:t>
             </a:fld>
             <a:endParaRPr lang="fr-FR"/>
           </a:p>
@@ -417,7 +423,7 @@
           <a:p>
             <a:fld id="{C262451B-073C-4FAC-8D0B-6648421A7945}" type="datetimeFigureOut">
               <a:rPr lang="fr-FR" smtClean="0"/>
-              <a:t>04/04/2020</a:t>
+              <a:t>06/04/2020</a:t>
             </a:fld>
             <a:endParaRPr lang="fr-FR"/>
           </a:p>
@@ -597,7 +603,7 @@
           <a:p>
             <a:fld id="{C262451B-073C-4FAC-8D0B-6648421A7945}" type="datetimeFigureOut">
               <a:rPr lang="fr-FR" smtClean="0"/>
-              <a:t>04/04/2020</a:t>
+              <a:t>06/04/2020</a:t>
             </a:fld>
             <a:endParaRPr lang="fr-FR"/>
           </a:p>
@@ -767,7 +773,7 @@
           <a:p>
             <a:fld id="{C262451B-073C-4FAC-8D0B-6648421A7945}" type="datetimeFigureOut">
               <a:rPr lang="fr-FR" smtClean="0"/>
-              <a:t>04/04/2020</a:t>
+              <a:t>06/04/2020</a:t>
             </a:fld>
             <a:endParaRPr lang="fr-FR"/>
           </a:p>
@@ -1013,7 +1019,7 @@
           <a:p>
             <a:fld id="{C262451B-073C-4FAC-8D0B-6648421A7945}" type="datetimeFigureOut">
               <a:rPr lang="fr-FR" smtClean="0"/>
-              <a:t>04/04/2020</a:t>
+              <a:t>06/04/2020</a:t>
             </a:fld>
             <a:endParaRPr lang="fr-FR"/>
           </a:p>
@@ -1245,7 +1251,7 @@
           <a:p>
             <a:fld id="{C262451B-073C-4FAC-8D0B-6648421A7945}" type="datetimeFigureOut">
               <a:rPr lang="fr-FR" smtClean="0"/>
-              <a:t>04/04/2020</a:t>
+              <a:t>06/04/2020</a:t>
             </a:fld>
             <a:endParaRPr lang="fr-FR"/>
           </a:p>
@@ -1612,7 +1618,7 @@
           <a:p>
             <a:fld id="{C262451B-073C-4FAC-8D0B-6648421A7945}" type="datetimeFigureOut">
               <a:rPr lang="fr-FR" smtClean="0"/>
-              <a:t>04/04/2020</a:t>
+              <a:t>06/04/2020</a:t>
             </a:fld>
             <a:endParaRPr lang="fr-FR"/>
           </a:p>
@@ -1730,7 +1736,7 @@
           <a:p>
             <a:fld id="{C262451B-073C-4FAC-8D0B-6648421A7945}" type="datetimeFigureOut">
               <a:rPr lang="fr-FR" smtClean="0"/>
-              <a:t>04/04/2020</a:t>
+              <a:t>06/04/2020</a:t>
             </a:fld>
             <a:endParaRPr lang="fr-FR"/>
           </a:p>
@@ -1825,7 +1831,7 @@
           <a:p>
             <a:fld id="{C262451B-073C-4FAC-8D0B-6648421A7945}" type="datetimeFigureOut">
               <a:rPr lang="fr-FR" smtClean="0"/>
-              <a:t>04/04/2020</a:t>
+              <a:t>06/04/2020</a:t>
             </a:fld>
             <a:endParaRPr lang="fr-FR"/>
           </a:p>
@@ -2102,7 +2108,7 @@
           <a:p>
             <a:fld id="{C262451B-073C-4FAC-8D0B-6648421A7945}" type="datetimeFigureOut">
               <a:rPr lang="fr-FR" smtClean="0"/>
-              <a:t>04/04/2020</a:t>
+              <a:t>06/04/2020</a:t>
             </a:fld>
             <a:endParaRPr lang="fr-FR"/>
           </a:p>
@@ -2355,7 +2361,7 @@
           <a:p>
             <a:fld id="{C262451B-073C-4FAC-8D0B-6648421A7945}" type="datetimeFigureOut">
               <a:rPr lang="fr-FR" smtClean="0"/>
-              <a:t>04/04/2020</a:t>
+              <a:t>06/04/2020</a:t>
             </a:fld>
             <a:endParaRPr lang="fr-FR"/>
           </a:p>
@@ -2568,7 +2574,7 @@
           <a:p>
             <a:fld id="{C262451B-073C-4FAC-8D0B-6648421A7945}" type="datetimeFigureOut">
               <a:rPr lang="fr-FR" smtClean="0"/>
-              <a:t>04/04/2020</a:t>
+              <a:t>06/04/2020</a:t>
             </a:fld>
             <a:endParaRPr lang="fr-FR"/>
           </a:p>
@@ -3002,23 +3008,7 @@
                   <a:srgbClr val="0070C0"/>
                 </a:solidFill>
               </a:rPr>
-              <a:t>LP12 </a:t>
-            </a:r>
-            <a:r>
-              <a:rPr lang="fr-FR" b="1" dirty="0" smtClean="0">
-                <a:solidFill>
-                  <a:srgbClr val="0070C0"/>
-                </a:solidFill>
-              </a:rPr>
-              <a:t>: </a:t>
-            </a:r>
-            <a:r>
-              <a:rPr lang="fr-FR" b="1" dirty="0" smtClean="0">
-                <a:solidFill>
-                  <a:srgbClr val="0070C0"/>
-                </a:solidFill>
-              </a:rPr>
-              <a:t>Traitement d’un signal,</a:t>
+              <a:t>LP12 : Traitement d’un signal,</a:t>
             </a:r>
             <a:br>
               <a:rPr lang="fr-FR" b="1" dirty="0" smtClean="0">
@@ -3041,15 +3031,7 @@
                   <a:srgbClr val="0070C0"/>
                 </a:solidFill>
               </a:rPr>
-              <a:t>	</a:t>
-            </a:r>
-            <a:r>
-              <a:rPr lang="fr-FR" b="1" dirty="0" smtClean="0">
-                <a:solidFill>
-                  <a:srgbClr val="0070C0"/>
-                </a:solidFill>
-              </a:rPr>
-              <a:t>étude spectrale</a:t>
+              <a:t>	étude spectrale</a:t>
             </a:r>
             <a:endParaRPr lang="fr-FR" dirty="0">
               <a:solidFill>
@@ -3125,7 +3107,7 @@
 </p:sld>
 </file>
 
-<file path=ppt/slides/slide2.xml><?xml version="1.0" encoding="utf-8"?>
+<file path=ppt/slides/slide10.xml><?xml version="1.0" encoding="utf-8"?>
 <p:sld xmlns:a="http://schemas.openxmlformats.org/drawingml/2006/main" xmlns:r="http://schemas.openxmlformats.org/officeDocument/2006/relationships" xmlns:p="http://schemas.openxmlformats.org/presentationml/2006/main">
   <p:cSld>
     <p:spTree>
@@ -3197,7 +3179,686 @@
                   <a:srgbClr val="0070C0"/>
                 </a:solidFill>
               </a:rPr>
-              <a:t>Décomposition en série de Fourier d’un signal carré</a:t>
+              <a:t>Filtrage numérique</a:t>
+            </a:r>
+            <a:endParaRPr lang="fr-FR" sz="3600" dirty="0">
+              <a:solidFill>
+                <a:srgbClr val="0070C0"/>
+              </a:solidFill>
+            </a:endParaRPr>
+          </a:p>
+        </p:txBody>
+      </p:sp>
+      <p:cxnSp>
+        <p:nvCxnSpPr>
+          <p:cNvPr id="5" name="Connecteur droit 4"/>
+          <p:cNvCxnSpPr/>
+          <p:nvPr/>
+        </p:nvCxnSpPr>
+        <p:spPr>
+          <a:xfrm>
+            <a:off x="220983" y="747252"/>
+            <a:ext cx="11754707" cy="0"/>
+          </a:xfrm>
+          <a:prstGeom prst="line">
+            <a:avLst/>
+          </a:prstGeom>
+          <a:ln w="76200">
+            <a:gradFill flip="none" rotWithShape="1">
+              <a:gsLst>
+                <a:gs pos="0">
+                  <a:srgbClr val="0070C0"/>
+                </a:gs>
+                <a:gs pos="100000">
+                  <a:srgbClr val="0070C0">
+                    <a:alpha val="25000"/>
+                  </a:srgbClr>
+                </a:gs>
+              </a:gsLst>
+              <a:lin ang="0" scaled="1"/>
+              <a:tileRect/>
+            </a:gradFill>
+          </a:ln>
+        </p:spPr>
+        <p:style>
+          <a:lnRef idx="1">
+            <a:schemeClr val="accent1"/>
+          </a:lnRef>
+          <a:fillRef idx="0">
+            <a:schemeClr val="accent1"/>
+          </a:fillRef>
+          <a:effectRef idx="0">
+            <a:schemeClr val="accent1"/>
+          </a:effectRef>
+          <a:fontRef idx="minor">
+            <a:schemeClr val="tx1"/>
+          </a:fontRef>
+        </p:style>
+      </p:cxnSp>
+      <p:pic>
+        <p:nvPicPr>
+          <p:cNvPr id="9" name="Image 8"/>
+          <p:cNvPicPr>
+            <a:picLocks noChangeAspect="1"/>
+          </p:cNvPicPr>
+          <p:nvPr/>
+        </p:nvPicPr>
+        <p:blipFill>
+          <a:blip r:embed="rId2">
+            <a:extLst>
+              <a:ext uri="{28A0092B-C50C-407E-A947-70E740481C1C}">
+                <a14:useLocalDpi xmlns:a14="http://schemas.microsoft.com/office/drawing/2010/main" val="0"/>
+              </a:ext>
+            </a:extLst>
+          </a:blip>
+          <a:stretch>
+            <a:fillRect/>
+          </a:stretch>
+        </p:blipFill>
+        <p:spPr>
+          <a:xfrm>
+            <a:off x="1330858" y="1100915"/>
+            <a:ext cx="8709434" cy="5690656"/>
+          </a:xfrm>
+          <a:prstGeom prst="rect">
+            <a:avLst/>
+          </a:prstGeom>
+        </p:spPr>
+      </p:pic>
+    </p:spTree>
+    <p:extLst>
+      <p:ext uri="{BB962C8B-B14F-4D97-AF65-F5344CB8AC3E}">
+        <p14:creationId xmlns:p14="http://schemas.microsoft.com/office/powerpoint/2010/main" val="3900548110"/>
+      </p:ext>
+    </p:extLst>
+  </p:cSld>
+  <p:clrMapOvr>
+    <a:masterClrMapping/>
+  </p:clrMapOvr>
+  <p:timing>
+    <p:tnLst>
+      <p:par>
+        <p:cTn id="1" dur="indefinite" restart="never" nodeType="tmRoot"/>
+      </p:par>
+    </p:tnLst>
+  </p:timing>
+</p:sld>
+</file>
+
+<file path=ppt/slides/slide11.xml><?xml version="1.0" encoding="utf-8"?>
+<p:sld xmlns:a="http://schemas.openxmlformats.org/drawingml/2006/main" xmlns:r="http://schemas.openxmlformats.org/officeDocument/2006/relationships" xmlns:p="http://schemas.openxmlformats.org/presentationml/2006/main">
+  <p:cSld>
+    <p:spTree>
+      <p:nvGrpSpPr>
+        <p:cNvPr id="1" name=""/>
+        <p:cNvGrpSpPr/>
+        <p:nvPr/>
+      </p:nvGrpSpPr>
+      <p:grpSpPr>
+        <a:xfrm>
+          <a:off x="0" y="0"/>
+          <a:ext cx="0" cy="0"/>
+          <a:chOff x="0" y="0"/>
+          <a:chExt cx="0" cy="0"/>
+        </a:xfrm>
+      </p:grpSpPr>
+      <p:sp>
+        <p:nvSpPr>
+          <p:cNvPr id="4" name="Titre 1"/>
+          <p:cNvSpPr txBox="1">
+            <a:spLocks/>
+          </p:cNvSpPr>
+          <p:nvPr/>
+        </p:nvSpPr>
+        <p:spPr>
+          <a:xfrm>
+            <a:off x="0" y="0"/>
+            <a:ext cx="12192000" cy="747252"/>
+          </a:xfrm>
+          <a:prstGeom prst="rect">
+            <a:avLst/>
+          </a:prstGeom>
+        </p:spPr>
+        <p:txBody>
+          <a:bodyPr vert="horz" lIns="91440" tIns="45720" rIns="91440" bIns="45720" rtlCol="0" anchor="ctr">
+            <a:normAutofit/>
+          </a:bodyPr>
+          <a:lstStyle>
+            <a:lvl1pPr algn="l" defTabSz="914400" rtl="0" eaLnBrk="1" latinLnBrk="0" hangingPunct="1">
+              <a:lnSpc>
+                <a:spcPct val="90000"/>
+              </a:lnSpc>
+              <a:spcBef>
+                <a:spcPct val="0"/>
+              </a:spcBef>
+              <a:buNone/>
+              <a:defRPr sz="4400" kern="1200">
+                <a:solidFill>
+                  <a:schemeClr val="tx1"/>
+                </a:solidFill>
+                <a:latin typeface="+mj-lt"/>
+                <a:ea typeface="+mj-ea"/>
+                <a:cs typeface="+mj-cs"/>
+              </a:defRPr>
+            </a:lvl1pPr>
+          </a:lstStyle>
+          <a:p>
+            <a:r>
+              <a:rPr lang="fr-FR" sz="3600" b="1" dirty="0" smtClean="0">
+                <a:solidFill>
+                  <a:srgbClr val="0070C0"/>
+                </a:solidFill>
+              </a:rPr>
+              <a:t>  Détection des ondes gravitationnelles</a:t>
+            </a:r>
+            <a:endParaRPr lang="fr-FR" sz="3600" dirty="0">
+              <a:solidFill>
+                <a:srgbClr val="0070C0"/>
+              </a:solidFill>
+            </a:endParaRPr>
+          </a:p>
+        </p:txBody>
+      </p:sp>
+      <p:cxnSp>
+        <p:nvCxnSpPr>
+          <p:cNvPr id="5" name="Connecteur droit 4"/>
+          <p:cNvCxnSpPr/>
+          <p:nvPr/>
+        </p:nvCxnSpPr>
+        <p:spPr>
+          <a:xfrm>
+            <a:off x="220983" y="747252"/>
+            <a:ext cx="11754707" cy="0"/>
+          </a:xfrm>
+          <a:prstGeom prst="line">
+            <a:avLst/>
+          </a:prstGeom>
+          <a:ln w="76200">
+            <a:gradFill flip="none" rotWithShape="1">
+              <a:gsLst>
+                <a:gs pos="0">
+                  <a:srgbClr val="0070C0"/>
+                </a:gs>
+                <a:gs pos="100000">
+                  <a:srgbClr val="0070C0">
+                    <a:alpha val="25000"/>
+                  </a:srgbClr>
+                </a:gs>
+              </a:gsLst>
+              <a:lin ang="0" scaled="1"/>
+              <a:tileRect/>
+            </a:gradFill>
+          </a:ln>
+        </p:spPr>
+        <p:style>
+          <a:lnRef idx="1">
+            <a:schemeClr val="accent1"/>
+          </a:lnRef>
+          <a:fillRef idx="0">
+            <a:schemeClr val="accent1"/>
+          </a:fillRef>
+          <a:effectRef idx="0">
+            <a:schemeClr val="accent1"/>
+          </a:effectRef>
+          <a:fontRef idx="minor">
+            <a:schemeClr val="tx1"/>
+          </a:fontRef>
+        </p:style>
+      </p:cxnSp>
+      <p:pic>
+        <p:nvPicPr>
+          <p:cNvPr id="3" name="Image 2"/>
+          <p:cNvPicPr>
+            <a:picLocks noChangeAspect="1"/>
+          </p:cNvPicPr>
+          <p:nvPr/>
+        </p:nvPicPr>
+        <p:blipFill>
+          <a:blip r:embed="rId6">
+            <a:extLst>
+              <a:ext uri="{28A0092B-C50C-407E-A947-70E740481C1C}">
+                <a14:useLocalDpi xmlns:a14="http://schemas.microsoft.com/office/drawing/2010/main" val="0"/>
+              </a:ext>
+            </a:extLst>
+          </a:blip>
+          <a:stretch>
+            <a:fillRect/>
+          </a:stretch>
+        </p:blipFill>
+        <p:spPr>
+          <a:xfrm>
+            <a:off x="0" y="1482124"/>
+            <a:ext cx="7138810" cy="4411785"/>
+          </a:xfrm>
+          <a:prstGeom prst="rect">
+            <a:avLst/>
+          </a:prstGeom>
+        </p:spPr>
+      </p:pic>
+      <p:pic>
+        <p:nvPicPr>
+          <p:cNvPr id="13" name="stereo_L1right_H1left_strain10s">
+            <a:hlinkClick r:id="" action="ppaction://media"/>
+          </p:cNvPr>
+          <p:cNvPicPr>
+            <a:picLocks noChangeAspect="1"/>
+          </p:cNvPicPr>
+          <p:nvPr>
+            <a:audioFile r:link="rId2"/>
+            <p:extLst>
+              <p:ext uri="{DAA4B4D4-6D71-4841-9C94-3DE7FCFB9230}">
+                <p14:media xmlns:p14="http://schemas.microsoft.com/office/powerpoint/2010/main" r:embed="rId1"/>
+              </p:ext>
+            </p:extLst>
+          </p:nvPr>
+        </p:nvPicPr>
+        <p:blipFill>
+          <a:blip r:embed="rId7"/>
+          <a:stretch>
+            <a:fillRect/>
+          </a:stretch>
+        </p:blipFill>
+        <p:spPr>
+          <a:xfrm>
+            <a:off x="3264605" y="1177323"/>
+            <a:ext cx="609600" cy="609600"/>
+          </a:xfrm>
+          <a:prstGeom prst="rect">
+            <a:avLst/>
+          </a:prstGeom>
+        </p:spPr>
+      </p:pic>
+      <p:pic>
+        <p:nvPicPr>
+          <p:cNvPr id="14" name="GW150914_H1left_L1right_shifted-unknowntimeshift">
+            <a:hlinkClick r:id="" action="ppaction://media"/>
+          </p:cNvPr>
+          <p:cNvPicPr>
+            <a:picLocks noChangeAspect="1"/>
+          </p:cNvPicPr>
+          <p:nvPr>
+            <a:audioFile r:link="rId4"/>
+            <p:extLst>
+              <p:ext uri="{DAA4B4D4-6D71-4841-9C94-3DE7FCFB9230}">
+                <p14:media xmlns:p14="http://schemas.microsoft.com/office/powerpoint/2010/main" r:embed="rId3"/>
+              </p:ext>
+            </p:extLst>
+          </p:nvPr>
+        </p:nvPicPr>
+        <p:blipFill>
+          <a:blip r:embed="rId7"/>
+          <a:stretch>
+            <a:fillRect/>
+          </a:stretch>
+        </p:blipFill>
+        <p:spPr>
+          <a:xfrm>
+            <a:off x="9047648" y="1177323"/>
+            <a:ext cx="609600" cy="609600"/>
+          </a:xfrm>
+          <a:prstGeom prst="rect">
+            <a:avLst/>
+          </a:prstGeom>
+        </p:spPr>
+      </p:pic>
+      <p:pic>
+        <p:nvPicPr>
+          <p:cNvPr id="15" name="Image 14"/>
+          <p:cNvPicPr>
+            <a:picLocks noChangeAspect="1"/>
+          </p:cNvPicPr>
+          <p:nvPr/>
+        </p:nvPicPr>
+        <p:blipFill rotWithShape="1">
+          <a:blip r:embed="rId8"/>
+          <a:srcRect l="41867" t="18228" r="37246" b="63375"/>
+          <a:stretch/>
+        </p:blipFill>
+        <p:spPr>
+          <a:xfrm>
+            <a:off x="6817696" y="2432163"/>
+            <a:ext cx="5069504" cy="2511706"/>
+          </a:xfrm>
+          <a:prstGeom prst="rect">
+            <a:avLst/>
+          </a:prstGeom>
+        </p:spPr>
+      </p:pic>
+      <p:pic>
+        <p:nvPicPr>
+          <p:cNvPr id="16" name="Image 15"/>
+          <p:cNvPicPr>
+            <a:picLocks noChangeAspect="1"/>
+          </p:cNvPicPr>
+          <p:nvPr/>
+        </p:nvPicPr>
+        <p:blipFill rotWithShape="1">
+          <a:blip r:embed="rId8"/>
+          <a:srcRect l="41867" t="81941" r="37246" b="12010"/>
+          <a:stretch/>
+        </p:blipFill>
+        <p:spPr>
+          <a:xfrm>
+            <a:off x="6817696" y="4943869"/>
+            <a:ext cx="5069504" cy="825908"/>
+          </a:xfrm>
+          <a:prstGeom prst="rect">
+            <a:avLst/>
+          </a:prstGeom>
+        </p:spPr>
+      </p:pic>
+      <p:sp>
+        <p:nvSpPr>
+          <p:cNvPr id="17" name="ZoneTexte 16"/>
+          <p:cNvSpPr txBox="1"/>
+          <p:nvPr/>
+        </p:nvSpPr>
+        <p:spPr>
+          <a:xfrm>
+            <a:off x="10261343" y="6488668"/>
+            <a:ext cx="1930657" cy="369332"/>
+          </a:xfrm>
+          <a:prstGeom prst="rect">
+            <a:avLst/>
+          </a:prstGeom>
+          <a:noFill/>
+        </p:spPr>
+        <p:txBody>
+          <a:bodyPr wrap="none" rtlCol="0">
+            <a:spAutoFit/>
+          </a:bodyPr>
+          <a:lstStyle/>
+          <a:p>
+            <a:r>
+              <a:rPr lang="fr-FR" dirty="0" smtClean="0"/>
+              <a:t>Abbott et al., 2016</a:t>
+            </a:r>
+            <a:endParaRPr lang="fr-FR" dirty="0"/>
+          </a:p>
+        </p:txBody>
+      </p:sp>
+      <p:sp>
+        <p:nvSpPr>
+          <p:cNvPr id="18" name="Rectangle 17"/>
+          <p:cNvSpPr/>
+          <p:nvPr/>
+        </p:nvSpPr>
+        <p:spPr>
+          <a:xfrm>
+            <a:off x="2205408" y="6488668"/>
+            <a:ext cx="4612288" cy="369332"/>
+          </a:xfrm>
+          <a:prstGeom prst="rect">
+            <a:avLst/>
+          </a:prstGeom>
+        </p:spPr>
+        <p:txBody>
+          <a:bodyPr wrap="none">
+            <a:spAutoFit/>
+          </a:bodyPr>
+          <a:lstStyle/>
+          <a:p>
+            <a:r>
+              <a:rPr lang="fr-FR" dirty="0">
+                <a:hlinkClick r:id="rId9"/>
+              </a:rPr>
+              <a:t>https://www.gw-openscience.org/o2speclines</a:t>
+            </a:r>
+            <a:r>
+              <a:rPr lang="fr-FR" dirty="0" smtClean="0">
+                <a:hlinkClick r:id="rId9"/>
+              </a:rPr>
+              <a:t>/</a:t>
+            </a:r>
+            <a:endParaRPr lang="fr-FR" dirty="0" smtClean="0"/>
+          </a:p>
+        </p:txBody>
+      </p:sp>
+    </p:spTree>
+    <p:extLst>
+      <p:ext uri="{BB962C8B-B14F-4D97-AF65-F5344CB8AC3E}">
+        <p14:creationId xmlns:p14="http://schemas.microsoft.com/office/powerpoint/2010/main" val="1739515517"/>
+      </p:ext>
+    </p:extLst>
+  </p:cSld>
+  <p:clrMapOvr>
+    <a:masterClrMapping/>
+  </p:clrMapOvr>
+  <p:timing>
+    <p:tnLst>
+      <p:par>
+        <p:cTn id="1" dur="indefinite" restart="never" nodeType="tmRoot">
+          <p:childTnLst>
+            <p:seq concurrent="1" nextAc="seek">
+              <p:cTn id="2" dur="indefinite" nodeType="mainSeq">
+                <p:childTnLst>
+                  <p:par>
+                    <p:cTn id="3" fill="hold">
+                      <p:stCondLst>
+                        <p:cond delay="indefinite"/>
+                      </p:stCondLst>
+                      <p:childTnLst>
+                        <p:par>
+                          <p:cTn id="4" fill="hold">
+                            <p:stCondLst>
+                              <p:cond delay="0"/>
+                            </p:stCondLst>
+                            <p:childTnLst>
+                              <p:par>
+                                <p:cTn id="5" presetID="1" presetClass="entr" presetSubtype="0" fill="hold" nodeType="clickEffect">
+                                  <p:stCondLst>
+                                    <p:cond delay="0"/>
+                                  </p:stCondLst>
+                                  <p:childTnLst>
+                                    <p:set>
+                                      <p:cBhvr>
+                                        <p:cTn id="6" dur="1" fill="hold">
+                                          <p:stCondLst>
+                                            <p:cond delay="0"/>
+                                          </p:stCondLst>
+                                        </p:cTn>
+                                        <p:tgtEl>
+                                          <p:spTgt spid="15"/>
+                                        </p:tgtEl>
+                                        <p:attrNameLst>
+                                          <p:attrName>style.visibility</p:attrName>
+                                        </p:attrNameLst>
+                                      </p:cBhvr>
+                                      <p:to>
+                                        <p:strVal val="visible"/>
+                                      </p:to>
+                                    </p:set>
+                                  </p:childTnLst>
+                                </p:cTn>
+                              </p:par>
+                              <p:par>
+                                <p:cTn id="7" presetID="1" presetClass="entr" presetSubtype="0" fill="hold" nodeType="withEffect">
+                                  <p:stCondLst>
+                                    <p:cond delay="0"/>
+                                  </p:stCondLst>
+                                  <p:childTnLst>
+                                    <p:set>
+                                      <p:cBhvr>
+                                        <p:cTn id="8" dur="1" fill="hold">
+                                          <p:stCondLst>
+                                            <p:cond delay="0"/>
+                                          </p:stCondLst>
+                                        </p:cTn>
+                                        <p:tgtEl>
+                                          <p:spTgt spid="16"/>
+                                        </p:tgtEl>
+                                        <p:attrNameLst>
+                                          <p:attrName>style.visibility</p:attrName>
+                                        </p:attrNameLst>
+                                      </p:cBhvr>
+                                      <p:to>
+                                        <p:strVal val="visible"/>
+                                      </p:to>
+                                    </p:set>
+                                  </p:childTnLst>
+                                </p:cTn>
+                              </p:par>
+                              <p:par>
+                                <p:cTn id="9" presetID="1" presetClass="entr" presetSubtype="0" fill="hold" nodeType="withEffect">
+                                  <p:stCondLst>
+                                    <p:cond delay="0"/>
+                                  </p:stCondLst>
+                                  <p:childTnLst>
+                                    <p:set>
+                                      <p:cBhvr>
+                                        <p:cTn id="10" dur="1" fill="hold">
+                                          <p:stCondLst>
+                                            <p:cond delay="0"/>
+                                          </p:stCondLst>
+                                        </p:cTn>
+                                        <p:tgtEl>
+                                          <p:spTgt spid="14"/>
+                                        </p:tgtEl>
+                                        <p:attrNameLst>
+                                          <p:attrName>style.visibility</p:attrName>
+                                        </p:attrNameLst>
+                                      </p:cBhvr>
+                                      <p:to>
+                                        <p:strVal val="visible"/>
+                                      </p:to>
+                                    </p:set>
+                                  </p:childTnLst>
+                                </p:cTn>
+                              </p:par>
+                            </p:childTnLst>
+                          </p:cTn>
+                        </p:par>
+                      </p:childTnLst>
+                    </p:cTn>
+                  </p:par>
+                </p:childTnLst>
+              </p:cTn>
+              <p:prevCondLst>
+                <p:cond evt="onPrev" delay="0">
+                  <p:tgtEl>
+                    <p:sldTgt/>
+                  </p:tgtEl>
+                </p:cond>
+              </p:prevCondLst>
+              <p:nextCondLst>
+                <p:cond evt="onNext" delay="0">
+                  <p:tgtEl>
+                    <p:sldTgt/>
+                  </p:tgtEl>
+                </p:cond>
+              </p:nextCondLst>
+            </p:seq>
+            <p:audio>
+              <p:cMediaNode vol="80000">
+                <p:cTn id="11" fill="hold" display="0">
+                  <p:stCondLst>
+                    <p:cond delay="indefinite"/>
+                  </p:stCondLst>
+                  <p:endCondLst>
+                    <p:cond evt="onStopAudio" delay="0">
+                      <p:tgtEl>
+                        <p:sldTgt/>
+                      </p:tgtEl>
+                    </p:cond>
+                  </p:endCondLst>
+                </p:cTn>
+                <p:tgtEl>
+                  <p:spTgt spid="13"/>
+                </p:tgtEl>
+              </p:cMediaNode>
+            </p:audio>
+            <p:audio>
+              <p:cMediaNode vol="80000">
+                <p:cTn id="12" fill="hold" display="0">
+                  <p:stCondLst>
+                    <p:cond delay="indefinite"/>
+                  </p:stCondLst>
+                  <p:endCondLst>
+                    <p:cond evt="onStopAudio" delay="0">
+                      <p:tgtEl>
+                        <p:sldTgt/>
+                      </p:tgtEl>
+                    </p:cond>
+                  </p:endCondLst>
+                </p:cTn>
+                <p:tgtEl>
+                  <p:spTgt spid="14"/>
+                </p:tgtEl>
+              </p:cMediaNode>
+            </p:audio>
+          </p:childTnLst>
+        </p:cTn>
+      </p:par>
+    </p:tnLst>
+  </p:timing>
+</p:sld>
+</file>
+
+<file path=ppt/slides/slide2.xml><?xml version="1.0" encoding="utf-8"?>
+<p:sld xmlns:a="http://schemas.openxmlformats.org/drawingml/2006/main" xmlns:r="http://schemas.openxmlformats.org/officeDocument/2006/relationships" xmlns:p="http://schemas.openxmlformats.org/presentationml/2006/main">
+  <p:cSld>
+    <p:spTree>
+      <p:nvGrpSpPr>
+        <p:cNvPr id="1" name=""/>
+        <p:cNvGrpSpPr/>
+        <p:nvPr/>
+      </p:nvGrpSpPr>
+      <p:grpSpPr>
+        <a:xfrm>
+          <a:off x="0" y="0"/>
+          <a:ext cx="0" cy="0"/>
+          <a:chOff x="0" y="0"/>
+          <a:chExt cx="0" cy="0"/>
+        </a:xfrm>
+      </p:grpSpPr>
+      <p:sp>
+        <p:nvSpPr>
+          <p:cNvPr id="4" name="Titre 1"/>
+          <p:cNvSpPr txBox="1">
+            <a:spLocks/>
+          </p:cNvSpPr>
+          <p:nvPr/>
+        </p:nvSpPr>
+        <p:spPr>
+          <a:xfrm>
+            <a:off x="0" y="0"/>
+            <a:ext cx="12192000" cy="747252"/>
+          </a:xfrm>
+          <a:prstGeom prst="rect">
+            <a:avLst/>
+          </a:prstGeom>
+        </p:spPr>
+        <p:txBody>
+          <a:bodyPr vert="horz" lIns="91440" tIns="45720" rIns="91440" bIns="45720" rtlCol="0" anchor="ctr">
+            <a:normAutofit/>
+          </a:bodyPr>
+          <a:lstStyle>
+            <a:lvl1pPr algn="l" defTabSz="914400" rtl="0" eaLnBrk="1" latinLnBrk="0" hangingPunct="1">
+              <a:lnSpc>
+                <a:spcPct val="90000"/>
+              </a:lnSpc>
+              <a:spcBef>
+                <a:spcPct val="0"/>
+              </a:spcBef>
+              <a:buNone/>
+              <a:defRPr sz="4400" kern="1200">
+                <a:solidFill>
+                  <a:schemeClr val="tx1"/>
+                </a:solidFill>
+                <a:latin typeface="+mj-lt"/>
+                <a:ea typeface="+mj-ea"/>
+                <a:cs typeface="+mj-cs"/>
+              </a:defRPr>
+            </a:lvl1pPr>
+          </a:lstStyle>
+          <a:p>
+            <a:r>
+              <a:rPr lang="fr-FR" sz="3600" b="1" dirty="0" smtClean="0">
+                <a:solidFill>
+                  <a:srgbClr val="0070C0"/>
+                </a:solidFill>
+              </a:rPr>
+              <a:t>  Décomposition en série de Fourier d’un signal carré</a:t>
             </a:r>
             <a:endParaRPr lang="fr-FR" sz="3600" dirty="0">
               <a:solidFill>
@@ -3276,7 +3937,7 @@
         <p:spPr>
           <a:xfrm>
             <a:off x="0" y="2067406"/>
-            <a:ext cx="12192000" cy="4790594"/>
+            <a:ext cx="12192000" cy="4790593"/>
           </a:xfrm>
           <a:prstGeom prst="rect">
             <a:avLst/>
@@ -3331,8 +3992,8 @@
           </a:p>
         </p:txBody>
       </p:sp>
-      <mc:AlternateContent xmlns:mc="http://schemas.openxmlformats.org/markup-compatibility/2006">
-        <mc:Choice xmlns:a14="http://schemas.microsoft.com/office/drawing/2010/main" Requires="a14">
+      <mc:AlternateContent xmlns:mc="http://schemas.openxmlformats.org/markup-compatibility/2006" xmlns:a14="http://schemas.microsoft.com/office/drawing/2010/main">
+        <mc:Choice Requires="a14">
           <p:sp>
             <p:nvSpPr>
               <p:cNvPr id="7" name="ZoneTexte 6"/>
@@ -3355,6 +4016,7 @@
               </a:bodyPr>
               <a:lstStyle/>
               <a:p>
+                <a:pPr/>
                 <a14:m>
                   <m:oMathPara xmlns:m="http://schemas.openxmlformats.org/officeDocument/2006/math">
                     <m:oMathParaPr>
@@ -3737,7 +4399,7 @@
             </p:txBody>
           </p:sp>
         </mc:Choice>
-        <mc:Fallback>
+        <mc:Fallback xmlns="">
           <p:sp>
             <p:nvSpPr>
               <p:cNvPr id="7" name="ZoneTexte 6"/>
@@ -3931,15 +4593,7 @@
                   <a:srgbClr val="0070C0"/>
                 </a:solidFill>
               </a:rPr>
-              <a:t>  </a:t>
-            </a:r>
-            <a:r>
-              <a:rPr lang="fr-FR" sz="3600" b="1" dirty="0" smtClean="0">
-                <a:solidFill>
-                  <a:srgbClr val="0070C0"/>
-                </a:solidFill>
-              </a:rPr>
-              <a:t>Spectre du signal sonore émis par un verre</a:t>
+              <a:t>  Spectre du signal sonore émis par un verre</a:t>
             </a:r>
             <a:endParaRPr lang="fr-FR" sz="3600" dirty="0">
               <a:solidFill>
@@ -4117,7 +4771,465 @@
                   <a:srgbClr val="0070C0"/>
                 </a:solidFill>
               </a:rPr>
-              <a:t>Modulation d’amplitude</a:t>
+              <a:t>Filtre pass</a:t>
+            </a:r>
+            <a:r>
+              <a:rPr lang="fr-FR" sz="3600" b="1" dirty="0" smtClean="0">
+                <a:solidFill>
+                  <a:srgbClr val="0070C0"/>
+                </a:solidFill>
+              </a:rPr>
+              <a:t>e-bas</a:t>
+            </a:r>
+            <a:endParaRPr lang="fr-FR" sz="3600" dirty="0">
+              <a:solidFill>
+                <a:srgbClr val="0070C0"/>
+              </a:solidFill>
+            </a:endParaRPr>
+          </a:p>
+        </p:txBody>
+      </p:sp>
+      <p:cxnSp>
+        <p:nvCxnSpPr>
+          <p:cNvPr id="5" name="Connecteur droit 4"/>
+          <p:cNvCxnSpPr/>
+          <p:nvPr/>
+        </p:nvCxnSpPr>
+        <p:spPr>
+          <a:xfrm>
+            <a:off x="220983" y="747252"/>
+            <a:ext cx="11754707" cy="0"/>
+          </a:xfrm>
+          <a:prstGeom prst="line">
+            <a:avLst/>
+          </a:prstGeom>
+          <a:ln w="76200">
+            <a:gradFill flip="none" rotWithShape="1">
+              <a:gsLst>
+                <a:gs pos="0">
+                  <a:srgbClr val="0070C0"/>
+                </a:gs>
+                <a:gs pos="100000">
+                  <a:srgbClr val="0070C0">
+                    <a:alpha val="25000"/>
+                  </a:srgbClr>
+                </a:gs>
+              </a:gsLst>
+              <a:lin ang="0" scaled="1"/>
+              <a:tileRect/>
+            </a:gradFill>
+          </a:ln>
+        </p:spPr>
+        <p:style>
+          <a:lnRef idx="1">
+            <a:schemeClr val="accent1"/>
+          </a:lnRef>
+          <a:fillRef idx="0">
+            <a:schemeClr val="accent1"/>
+          </a:fillRef>
+          <a:effectRef idx="0">
+            <a:schemeClr val="accent1"/>
+          </a:effectRef>
+          <a:fontRef idx="minor">
+            <a:schemeClr val="tx1"/>
+          </a:fontRef>
+        </p:style>
+      </p:cxnSp>
+      <p:pic>
+        <p:nvPicPr>
+          <p:cNvPr id="3" name="Image 2"/>
+          <p:cNvPicPr>
+            <a:picLocks noChangeAspect="1"/>
+          </p:cNvPicPr>
+          <p:nvPr/>
+        </p:nvPicPr>
+        <p:blipFill>
+          <a:blip r:embed="rId2">
+            <a:extLst>
+              <a:ext uri="{28A0092B-C50C-407E-A947-70E740481C1C}">
+                <a14:useLocalDpi xmlns:a14="http://schemas.microsoft.com/office/drawing/2010/main" val="0"/>
+              </a:ext>
+            </a:extLst>
+          </a:blip>
+          <a:stretch>
+            <a:fillRect/>
+          </a:stretch>
+        </p:blipFill>
+        <p:spPr>
+          <a:xfrm>
+            <a:off x="1" y="2067407"/>
+            <a:ext cx="12191997" cy="4790593"/>
+          </a:xfrm>
+          <a:prstGeom prst="rect">
+            <a:avLst/>
+          </a:prstGeom>
+        </p:spPr>
+      </p:pic>
+      <mc:AlternateContent xmlns:mc="http://schemas.openxmlformats.org/markup-compatibility/2006">
+        <mc:Choice xmlns:a14="http://schemas.microsoft.com/office/drawing/2010/main" Requires="a14">
+          <p:sp>
+            <p:nvSpPr>
+              <p:cNvPr id="7" name="ZoneTexte 6"/>
+              <p:cNvSpPr txBox="1"/>
+              <p:nvPr/>
+            </p:nvSpPr>
+            <p:spPr>
+              <a:xfrm>
+                <a:off x="5107940" y="1208111"/>
+                <a:ext cx="1976118" cy="572786"/>
+              </a:xfrm>
+              <a:prstGeom prst="rect">
+                <a:avLst/>
+              </a:prstGeom>
+              <a:noFill/>
+            </p:spPr>
+            <p:txBody>
+              <a:bodyPr wrap="none" lIns="0" tIns="0" rIns="0" bIns="0" rtlCol="0">
+                <a:spAutoFit/>
+              </a:bodyPr>
+              <a:lstStyle/>
+              <a:p>
+                <a:pPr/>
+                <a14:m>
+                  <m:oMathPara xmlns:m="http://schemas.openxmlformats.org/officeDocument/2006/math">
+                    <m:oMathParaPr>
+                      <m:jc m:val="centerGroup"/>
+                    </m:oMathParaPr>
+                    <m:oMath xmlns:m="http://schemas.openxmlformats.org/officeDocument/2006/math">
+                      <m:f>
+                        <m:fPr>
+                          <m:ctrlPr>
+                            <a:rPr lang="fr-FR" b="0" i="1" smtClean="0">
+                              <a:solidFill>
+                                <a:schemeClr val="accent1"/>
+                              </a:solidFill>
+                              <a:latin typeface="Cambria Math" panose="02040503050406030204" pitchFamily="18" charset="0"/>
+                            </a:rPr>
+                          </m:ctrlPr>
+                        </m:fPr>
+                        <m:num>
+                          <m:r>
+                            <a:rPr lang="fr-FR" b="0" i="1" smtClean="0">
+                              <a:solidFill>
+                                <a:schemeClr val="accent1"/>
+                              </a:solidFill>
+                              <a:latin typeface="Cambria Math" panose="02040503050406030204" pitchFamily="18" charset="0"/>
+                            </a:rPr>
+                            <m:t>1</m:t>
+                          </m:r>
+                        </m:num>
+                        <m:den>
+                          <m:sSub>
+                            <m:sSubPr>
+                              <m:ctrlPr>
+                                <a:rPr lang="fr-FR" i="1">
+                                  <a:solidFill>
+                                    <a:schemeClr val="accent1"/>
+                                  </a:solidFill>
+                                  <a:latin typeface="Cambria Math" panose="02040503050406030204" pitchFamily="18" charset="0"/>
+                                </a:rPr>
+                              </m:ctrlPr>
+                            </m:sSubPr>
+                            <m:e>
+                              <m:r>
+                                <a:rPr lang="fr-FR" i="1">
+                                  <a:solidFill>
+                                    <a:schemeClr val="accent1"/>
+                                  </a:solidFill>
+                                  <a:latin typeface="Cambria Math" panose="02040503050406030204" pitchFamily="18" charset="0"/>
+                                </a:rPr>
+                                <m:t>𝜔</m:t>
+                              </m:r>
+                            </m:e>
+                            <m:sub>
+                              <m:r>
+                                <a:rPr lang="fr-FR" i="1">
+                                  <a:solidFill>
+                                    <a:schemeClr val="accent1"/>
+                                  </a:solidFill>
+                                  <a:latin typeface="Cambria Math" panose="02040503050406030204" pitchFamily="18" charset="0"/>
+                                </a:rPr>
+                                <m:t>𝑐</m:t>
+                              </m:r>
+                            </m:sub>
+                          </m:sSub>
+                        </m:den>
+                      </m:f>
+                      <m:f>
+                        <m:fPr>
+                          <m:ctrlPr>
+                            <a:rPr lang="fr-FR" b="0" i="1" smtClean="0">
+                              <a:solidFill>
+                                <a:schemeClr val="accent1"/>
+                              </a:solidFill>
+                              <a:latin typeface="Cambria Math" panose="02040503050406030204" pitchFamily="18" charset="0"/>
+                            </a:rPr>
+                          </m:ctrlPr>
+                        </m:fPr>
+                        <m:num>
+                          <m:r>
+                            <m:rPr>
+                              <m:sty m:val="p"/>
+                            </m:rPr>
+                            <a:rPr lang="fr-FR" b="0" i="0" smtClean="0">
+                              <a:solidFill>
+                                <a:schemeClr val="accent1"/>
+                              </a:solidFill>
+                              <a:latin typeface="Cambria Math" panose="02040503050406030204" pitchFamily="18" charset="0"/>
+                            </a:rPr>
+                            <m:t>d</m:t>
+                          </m:r>
+                          <m:r>
+                            <a:rPr lang="fr-FR" b="0" i="1" smtClean="0">
+                              <a:solidFill>
+                                <a:schemeClr val="accent1"/>
+                              </a:solidFill>
+                              <a:latin typeface="Cambria Math" panose="02040503050406030204" pitchFamily="18" charset="0"/>
+                            </a:rPr>
+                            <m:t>𝑠</m:t>
+                          </m:r>
+                        </m:num>
+                        <m:den>
+                          <m:r>
+                            <m:rPr>
+                              <m:sty m:val="p"/>
+                            </m:rPr>
+                            <a:rPr lang="fr-FR" b="0" i="0" smtClean="0">
+                              <a:solidFill>
+                                <a:schemeClr val="accent1"/>
+                              </a:solidFill>
+                              <a:latin typeface="Cambria Math" panose="02040503050406030204" pitchFamily="18" charset="0"/>
+                            </a:rPr>
+                            <m:t>d</m:t>
+                          </m:r>
+                          <m:r>
+                            <a:rPr lang="fr-FR" b="0" i="1" smtClean="0">
+                              <a:solidFill>
+                                <a:schemeClr val="accent1"/>
+                              </a:solidFill>
+                              <a:latin typeface="Cambria Math" panose="02040503050406030204" pitchFamily="18" charset="0"/>
+                            </a:rPr>
+                            <m:t>𝑡</m:t>
+                          </m:r>
+                        </m:den>
+                      </m:f>
+                      <m:r>
+                        <a:rPr lang="fr-FR" b="0" i="1" smtClean="0">
+                          <a:solidFill>
+                            <a:schemeClr val="accent1"/>
+                          </a:solidFill>
+                          <a:latin typeface="Cambria Math" panose="02040503050406030204" pitchFamily="18" charset="0"/>
+                        </a:rPr>
+                        <m:t>+</m:t>
+                      </m:r>
+                      <m:r>
+                        <a:rPr lang="fr-FR" b="0" i="1" smtClean="0">
+                          <a:solidFill>
+                            <a:schemeClr val="accent1"/>
+                          </a:solidFill>
+                          <a:latin typeface="Cambria Math" panose="02040503050406030204" pitchFamily="18" charset="0"/>
+                        </a:rPr>
+                        <m:t>𝑠</m:t>
+                      </m:r>
+                      <m:r>
+                        <a:rPr lang="fr-FR" b="0" i="1" smtClean="0">
+                          <a:solidFill>
+                            <a:schemeClr val="accent1"/>
+                          </a:solidFill>
+                          <a:latin typeface="Cambria Math" panose="02040503050406030204" pitchFamily="18" charset="0"/>
+                        </a:rPr>
+                        <m:t>(</m:t>
+                      </m:r>
+                      <m:r>
+                        <a:rPr lang="fr-FR" b="0" i="1" smtClean="0">
+                          <a:solidFill>
+                            <a:schemeClr val="accent1"/>
+                          </a:solidFill>
+                          <a:latin typeface="Cambria Math" panose="02040503050406030204" pitchFamily="18" charset="0"/>
+                        </a:rPr>
+                        <m:t>𝑡</m:t>
+                      </m:r>
+                      <m:r>
+                        <a:rPr lang="fr-FR" b="0" i="1" smtClean="0">
+                          <a:solidFill>
+                            <a:schemeClr val="accent1"/>
+                          </a:solidFill>
+                          <a:latin typeface="Cambria Math" panose="02040503050406030204" pitchFamily="18" charset="0"/>
+                        </a:rPr>
+                        <m:t>)=</m:t>
+                      </m:r>
+                      <m:r>
+                        <a:rPr lang="fr-FR" b="0" i="1" smtClean="0">
+                          <a:solidFill>
+                            <a:schemeClr val="accent1"/>
+                          </a:solidFill>
+                          <a:latin typeface="Cambria Math" panose="02040503050406030204" pitchFamily="18" charset="0"/>
+                        </a:rPr>
+                        <m:t>𝑒</m:t>
+                      </m:r>
+                      <m:r>
+                        <a:rPr lang="fr-FR" b="0" i="1" smtClean="0">
+                          <a:solidFill>
+                            <a:schemeClr val="accent1"/>
+                          </a:solidFill>
+                          <a:latin typeface="Cambria Math" panose="02040503050406030204" pitchFamily="18" charset="0"/>
+                        </a:rPr>
+                        <m:t>(</m:t>
+                      </m:r>
+                      <m:r>
+                        <a:rPr lang="fr-FR" b="0" i="1" smtClean="0">
+                          <a:solidFill>
+                            <a:schemeClr val="accent1"/>
+                          </a:solidFill>
+                          <a:latin typeface="Cambria Math" panose="02040503050406030204" pitchFamily="18" charset="0"/>
+                        </a:rPr>
+                        <m:t>𝑡</m:t>
+                      </m:r>
+                      <m:r>
+                        <a:rPr lang="fr-FR" b="0" i="1" smtClean="0">
+                          <a:solidFill>
+                            <a:schemeClr val="accent1"/>
+                          </a:solidFill>
+                          <a:latin typeface="Cambria Math" panose="02040503050406030204" pitchFamily="18" charset="0"/>
+                        </a:rPr>
+                        <m:t>)</m:t>
+                      </m:r>
+                    </m:oMath>
+                  </m:oMathPara>
+                </a14:m>
+                <a:endParaRPr lang="fr-FR" dirty="0">
+                  <a:solidFill>
+                    <a:schemeClr val="accent1"/>
+                  </a:solidFill>
+                </a:endParaRPr>
+              </a:p>
+            </p:txBody>
+          </p:sp>
+        </mc:Choice>
+        <mc:Fallback>
+          <p:sp>
+            <p:nvSpPr>
+              <p:cNvPr id="7" name="ZoneTexte 6"/>
+              <p:cNvSpPr txBox="1">
+                <a:spLocks noRot="1" noChangeAspect="1" noMove="1" noResize="1" noEditPoints="1" noAdjustHandles="1" noChangeArrowheads="1" noChangeShapeType="1" noTextEdit="1"/>
+              </p:cNvSpPr>
+              <p:nvPr/>
+            </p:nvSpPr>
+            <p:spPr>
+              <a:xfrm>
+                <a:off x="5107940" y="1208111"/>
+                <a:ext cx="1976118" cy="572786"/>
+              </a:xfrm>
+              <a:prstGeom prst="rect">
+                <a:avLst/>
+              </a:prstGeom>
+              <a:blipFill rotWithShape="0">
+                <a:blip r:embed="rId3"/>
+                <a:stretch>
+                  <a:fillRect/>
+                </a:stretch>
+              </a:blipFill>
+            </p:spPr>
+            <p:txBody>
+              <a:bodyPr/>
+              <a:lstStyle/>
+              <a:p>
+                <a:r>
+                  <a:rPr lang="fr-FR">
+                    <a:noFill/>
+                  </a:rPr>
+                  <a:t> </a:t>
+                </a:r>
+              </a:p>
+            </p:txBody>
+          </p:sp>
+        </mc:Fallback>
+      </mc:AlternateContent>
+    </p:spTree>
+    <p:extLst>
+      <p:ext uri="{BB962C8B-B14F-4D97-AF65-F5344CB8AC3E}">
+        <p14:creationId xmlns:p14="http://schemas.microsoft.com/office/powerpoint/2010/main" val="471597329"/>
+      </p:ext>
+    </p:extLst>
+  </p:cSld>
+  <p:clrMapOvr>
+    <a:masterClrMapping/>
+  </p:clrMapOvr>
+  <p:timing>
+    <p:tnLst>
+      <p:par>
+        <p:cTn id="1" dur="indefinite" restart="never" nodeType="tmRoot"/>
+      </p:par>
+    </p:tnLst>
+  </p:timing>
+</p:sld>
+</file>
+
+<file path=ppt/slides/slide5.xml><?xml version="1.0" encoding="utf-8"?>
+<p:sld xmlns:a="http://schemas.openxmlformats.org/drawingml/2006/main" xmlns:r="http://schemas.openxmlformats.org/officeDocument/2006/relationships" xmlns:p="http://schemas.openxmlformats.org/presentationml/2006/main">
+  <p:cSld>
+    <p:spTree>
+      <p:nvGrpSpPr>
+        <p:cNvPr id="1" name=""/>
+        <p:cNvGrpSpPr/>
+        <p:nvPr/>
+      </p:nvGrpSpPr>
+      <p:grpSpPr>
+        <a:xfrm>
+          <a:off x="0" y="0"/>
+          <a:ext cx="0" cy="0"/>
+          <a:chOff x="0" y="0"/>
+          <a:chExt cx="0" cy="0"/>
+        </a:xfrm>
+      </p:grpSpPr>
+      <p:sp>
+        <p:nvSpPr>
+          <p:cNvPr id="4" name="Titre 1"/>
+          <p:cNvSpPr txBox="1">
+            <a:spLocks/>
+          </p:cNvSpPr>
+          <p:nvPr/>
+        </p:nvSpPr>
+        <p:spPr>
+          <a:xfrm>
+            <a:off x="0" y="0"/>
+            <a:ext cx="12192000" cy="747252"/>
+          </a:xfrm>
+          <a:prstGeom prst="rect">
+            <a:avLst/>
+          </a:prstGeom>
+        </p:spPr>
+        <p:txBody>
+          <a:bodyPr vert="horz" lIns="91440" tIns="45720" rIns="91440" bIns="45720" rtlCol="0" anchor="ctr">
+            <a:normAutofit/>
+          </a:bodyPr>
+          <a:lstStyle>
+            <a:lvl1pPr algn="l" defTabSz="914400" rtl="0" eaLnBrk="1" latinLnBrk="0" hangingPunct="1">
+              <a:lnSpc>
+                <a:spcPct val="90000"/>
+              </a:lnSpc>
+              <a:spcBef>
+                <a:spcPct val="0"/>
+              </a:spcBef>
+              <a:buNone/>
+              <a:defRPr sz="4400" kern="1200">
+                <a:solidFill>
+                  <a:schemeClr val="tx1"/>
+                </a:solidFill>
+                <a:latin typeface="+mj-lt"/>
+                <a:ea typeface="+mj-ea"/>
+                <a:cs typeface="+mj-cs"/>
+              </a:defRPr>
+            </a:lvl1pPr>
+          </a:lstStyle>
+          <a:p>
+            <a:r>
+              <a:rPr lang="fr-FR" sz="3600" b="1" dirty="0" smtClean="0">
+                <a:solidFill>
+                  <a:srgbClr val="0070C0"/>
+                </a:solidFill>
+              </a:rPr>
+              <a:t>  Modulation d’amplitude</a:t>
             </a:r>
             <a:endParaRPr lang="fr-FR" sz="3600" dirty="0">
               <a:solidFill>
@@ -4529,7 +5641,7 @@
 </p:sld>
 </file>
 
-<file path=ppt/slides/slide5.xml><?xml version="1.0" encoding="utf-8"?>
+<file path=ppt/slides/slide6.xml><?xml version="1.0" encoding="utf-8"?>
 <p:sld xmlns:a="http://schemas.openxmlformats.org/drawingml/2006/main" xmlns:r="http://schemas.openxmlformats.org/officeDocument/2006/relationships" xmlns:p="http://schemas.openxmlformats.org/presentationml/2006/main">
   <p:cSld>
     <p:spTree>
@@ -4601,7 +5713,769 @@
                   <a:srgbClr val="0070C0"/>
                 </a:solidFill>
               </a:rPr>
-              <a:t>Détection des ondes gravitationnelles</a:t>
+              <a:t>Démodulation </a:t>
+            </a:r>
+            <a:r>
+              <a:rPr lang="fr-FR" sz="3600" b="1" dirty="0" smtClean="0">
+                <a:solidFill>
+                  <a:srgbClr val="0070C0"/>
+                </a:solidFill>
+              </a:rPr>
+              <a:t>d’amplitude</a:t>
+            </a:r>
+            <a:endParaRPr lang="fr-FR" sz="3600" dirty="0">
+              <a:solidFill>
+                <a:srgbClr val="0070C0"/>
+              </a:solidFill>
+            </a:endParaRPr>
+          </a:p>
+        </p:txBody>
+      </p:sp>
+      <p:cxnSp>
+        <p:nvCxnSpPr>
+          <p:cNvPr id="5" name="Connecteur droit 4"/>
+          <p:cNvCxnSpPr/>
+          <p:nvPr/>
+        </p:nvCxnSpPr>
+        <p:spPr>
+          <a:xfrm>
+            <a:off x="220983" y="747252"/>
+            <a:ext cx="11754707" cy="0"/>
+          </a:xfrm>
+          <a:prstGeom prst="line">
+            <a:avLst/>
+          </a:prstGeom>
+          <a:ln w="76200">
+            <a:gradFill flip="none" rotWithShape="1">
+              <a:gsLst>
+                <a:gs pos="0">
+                  <a:srgbClr val="0070C0"/>
+                </a:gs>
+                <a:gs pos="100000">
+                  <a:srgbClr val="0070C0">
+                    <a:alpha val="25000"/>
+                  </a:srgbClr>
+                </a:gs>
+              </a:gsLst>
+              <a:lin ang="0" scaled="1"/>
+              <a:tileRect/>
+            </a:gradFill>
+          </a:ln>
+        </p:spPr>
+        <p:style>
+          <a:lnRef idx="1">
+            <a:schemeClr val="accent1"/>
+          </a:lnRef>
+          <a:fillRef idx="0">
+            <a:schemeClr val="accent1"/>
+          </a:fillRef>
+          <a:effectRef idx="0">
+            <a:schemeClr val="accent1"/>
+          </a:effectRef>
+          <a:fontRef idx="minor">
+            <a:schemeClr val="tx1"/>
+          </a:fontRef>
+        </p:style>
+      </p:cxnSp>
+      <p:pic>
+        <p:nvPicPr>
+          <p:cNvPr id="8" name="Image 7"/>
+          <p:cNvPicPr>
+            <a:picLocks noChangeAspect="1"/>
+          </p:cNvPicPr>
+          <p:nvPr/>
+        </p:nvPicPr>
+        <p:blipFill>
+          <a:blip r:embed="rId2">
+            <a:extLst>
+              <a:ext uri="{28A0092B-C50C-407E-A947-70E740481C1C}">
+                <a14:useLocalDpi xmlns:a14="http://schemas.microsoft.com/office/drawing/2010/main" val="0"/>
+              </a:ext>
+            </a:extLst>
+          </a:blip>
+          <a:stretch>
+            <a:fillRect/>
+          </a:stretch>
+        </p:blipFill>
+        <p:spPr>
+          <a:xfrm>
+            <a:off x="4312916" y="1185777"/>
+            <a:ext cx="3566167" cy="5394971"/>
+          </a:xfrm>
+          <a:prstGeom prst="rect">
+            <a:avLst/>
+          </a:prstGeom>
+        </p:spPr>
+      </p:pic>
+      <p:pic>
+        <p:nvPicPr>
+          <p:cNvPr id="9" name="Image 8"/>
+          <p:cNvPicPr>
+            <a:picLocks noChangeAspect="1"/>
+          </p:cNvPicPr>
+          <p:nvPr/>
+        </p:nvPicPr>
+        <p:blipFill>
+          <a:blip r:embed="rId3">
+            <a:extLst>
+              <a:ext uri="{28A0092B-C50C-407E-A947-70E740481C1C}">
+                <a14:useLocalDpi xmlns:a14="http://schemas.microsoft.com/office/drawing/2010/main" val="0"/>
+              </a:ext>
+            </a:extLst>
+          </a:blip>
+          <a:stretch>
+            <a:fillRect/>
+          </a:stretch>
+        </p:blipFill>
+        <p:spPr>
+          <a:xfrm>
+            <a:off x="216309" y="1185777"/>
+            <a:ext cx="3566167" cy="5394971"/>
+          </a:xfrm>
+          <a:prstGeom prst="rect">
+            <a:avLst/>
+          </a:prstGeom>
+        </p:spPr>
+      </p:pic>
+      <p:pic>
+        <p:nvPicPr>
+          <p:cNvPr id="10" name="Image 9"/>
+          <p:cNvPicPr>
+            <a:picLocks noChangeAspect="1"/>
+          </p:cNvPicPr>
+          <p:nvPr/>
+        </p:nvPicPr>
+        <p:blipFill>
+          <a:blip r:embed="rId4">
+            <a:extLst>
+              <a:ext uri="{28A0092B-C50C-407E-A947-70E740481C1C}">
+                <a14:useLocalDpi xmlns:a14="http://schemas.microsoft.com/office/drawing/2010/main" val="0"/>
+              </a:ext>
+            </a:extLst>
+          </a:blip>
+          <a:stretch>
+            <a:fillRect/>
+          </a:stretch>
+        </p:blipFill>
+        <p:spPr>
+          <a:xfrm>
+            <a:off x="8409523" y="1185777"/>
+            <a:ext cx="3566167" cy="5394971"/>
+          </a:xfrm>
+          <a:prstGeom prst="rect">
+            <a:avLst/>
+          </a:prstGeom>
+        </p:spPr>
+      </p:pic>
+      <p:sp>
+        <p:nvSpPr>
+          <p:cNvPr id="11" name="Multiplier 10"/>
+          <p:cNvSpPr/>
+          <p:nvPr/>
+        </p:nvSpPr>
+        <p:spPr>
+          <a:xfrm>
+            <a:off x="3687696" y="1995948"/>
+            <a:ext cx="720000" cy="720000"/>
+          </a:xfrm>
+          <a:prstGeom prst="mathMultiply">
+            <a:avLst/>
+          </a:prstGeom>
+          <a:gradFill flip="none" rotWithShape="1">
+            <a:gsLst>
+              <a:gs pos="0">
+                <a:schemeClr val="accent6"/>
+              </a:gs>
+              <a:gs pos="100000">
+                <a:schemeClr val="accent6">
+                  <a:lumMod val="20000"/>
+                  <a:lumOff val="80000"/>
+                </a:schemeClr>
+              </a:gs>
+            </a:gsLst>
+            <a:lin ang="2700000" scaled="1"/>
+            <a:tileRect/>
+          </a:gradFill>
+          <a:ln>
+            <a:noFill/>
+          </a:ln>
+        </p:spPr>
+        <p:style>
+          <a:lnRef idx="2">
+            <a:schemeClr val="accent1">
+              <a:shade val="50000"/>
+            </a:schemeClr>
+          </a:lnRef>
+          <a:fillRef idx="1">
+            <a:schemeClr val="accent1"/>
+          </a:fillRef>
+          <a:effectRef idx="0">
+            <a:schemeClr val="accent1"/>
+          </a:effectRef>
+          <a:fontRef idx="minor">
+            <a:schemeClr val="lt1"/>
+          </a:fontRef>
+        </p:style>
+        <p:txBody>
+          <a:bodyPr rtlCol="0" anchor="ctr"/>
+          <a:lstStyle/>
+          <a:p>
+            <a:pPr algn="ctr"/>
+            <a:endParaRPr lang="fr-FR"/>
+          </a:p>
+        </p:txBody>
+      </p:sp>
+      <p:sp>
+        <p:nvSpPr>
+          <p:cNvPr id="12" name="Égal 11"/>
+          <p:cNvSpPr/>
+          <p:nvPr/>
+        </p:nvSpPr>
+        <p:spPr>
+          <a:xfrm>
+            <a:off x="7784303" y="1995948"/>
+            <a:ext cx="720000" cy="720000"/>
+          </a:xfrm>
+          <a:prstGeom prst="mathEqual">
+            <a:avLst/>
+          </a:prstGeom>
+          <a:gradFill flip="none" rotWithShape="1">
+            <a:gsLst>
+              <a:gs pos="0">
+                <a:schemeClr val="accent6"/>
+              </a:gs>
+              <a:gs pos="100000">
+                <a:schemeClr val="accent6">
+                  <a:lumMod val="20000"/>
+                  <a:lumOff val="80000"/>
+                </a:schemeClr>
+              </a:gs>
+            </a:gsLst>
+            <a:lin ang="2700000" scaled="1"/>
+            <a:tileRect/>
+          </a:gradFill>
+          <a:ln>
+            <a:noFill/>
+          </a:ln>
+        </p:spPr>
+        <p:style>
+          <a:lnRef idx="2">
+            <a:schemeClr val="accent1">
+              <a:shade val="50000"/>
+            </a:schemeClr>
+          </a:lnRef>
+          <a:fillRef idx="1">
+            <a:schemeClr val="accent1"/>
+          </a:fillRef>
+          <a:effectRef idx="0">
+            <a:schemeClr val="accent1"/>
+          </a:effectRef>
+          <a:fontRef idx="minor">
+            <a:schemeClr val="lt1"/>
+          </a:fontRef>
+        </p:style>
+        <p:txBody>
+          <a:bodyPr rtlCol="0" anchor="ctr"/>
+          <a:lstStyle/>
+          <a:p>
+            <a:pPr algn="ctr"/>
+            <a:endParaRPr lang="fr-FR">
+              <a:solidFill>
+                <a:schemeClr val="tx1"/>
+              </a:solidFill>
+            </a:endParaRPr>
+          </a:p>
+        </p:txBody>
+      </p:sp>
+      <p:pic>
+        <p:nvPicPr>
+          <p:cNvPr id="2" name="Image 1"/>
+          <p:cNvPicPr>
+            <a:picLocks noChangeAspect="1"/>
+          </p:cNvPicPr>
+          <p:nvPr/>
+        </p:nvPicPr>
+        <p:blipFill>
+          <a:blip r:embed="rId5">
+            <a:extLst>
+              <a:ext uri="{28A0092B-C50C-407E-A947-70E740481C1C}">
+                <a14:useLocalDpi xmlns:a14="http://schemas.microsoft.com/office/drawing/2010/main" val="0"/>
+              </a:ext>
+            </a:extLst>
+          </a:blip>
+          <a:stretch>
+            <a:fillRect/>
+          </a:stretch>
+        </p:blipFill>
+        <p:spPr>
+          <a:xfrm>
+            <a:off x="8409523" y="1185776"/>
+            <a:ext cx="3566167" cy="5394971"/>
+          </a:xfrm>
+          <a:prstGeom prst="rect">
+            <a:avLst/>
+          </a:prstGeom>
+        </p:spPr>
+      </p:pic>
+    </p:spTree>
+    <p:extLst>
+      <p:ext uri="{BB962C8B-B14F-4D97-AF65-F5344CB8AC3E}">
+        <p14:creationId xmlns:p14="http://schemas.microsoft.com/office/powerpoint/2010/main" val="4272814047"/>
+      </p:ext>
+    </p:extLst>
+  </p:cSld>
+  <p:clrMapOvr>
+    <a:masterClrMapping/>
+  </p:clrMapOvr>
+  <p:timing>
+    <p:tnLst>
+      <p:par>
+        <p:cTn id="1" dur="indefinite" restart="never" nodeType="tmRoot">
+          <p:childTnLst>
+            <p:seq concurrent="1" nextAc="seek">
+              <p:cTn id="2" dur="indefinite" nodeType="mainSeq">
+                <p:childTnLst>
+                  <p:par>
+                    <p:cTn id="3" fill="hold">
+                      <p:stCondLst>
+                        <p:cond delay="indefinite"/>
+                      </p:stCondLst>
+                      <p:childTnLst>
+                        <p:par>
+                          <p:cTn id="4" fill="hold">
+                            <p:stCondLst>
+                              <p:cond delay="0"/>
+                            </p:stCondLst>
+                            <p:childTnLst>
+                              <p:par>
+                                <p:cTn id="5" presetID="1" presetClass="exit" presetSubtype="0" fill="hold" grpId="0" nodeType="clickEffect">
+                                  <p:stCondLst>
+                                    <p:cond delay="0"/>
+                                  </p:stCondLst>
+                                  <p:childTnLst>
+                                    <p:set>
+                                      <p:cBhvr>
+                                        <p:cTn id="6" dur="1" fill="hold">
+                                          <p:stCondLst>
+                                            <p:cond delay="0"/>
+                                          </p:stCondLst>
+                                        </p:cTn>
+                                        <p:tgtEl>
+                                          <p:spTgt spid="12"/>
+                                        </p:tgtEl>
+                                        <p:attrNameLst>
+                                          <p:attrName>style.visibility</p:attrName>
+                                        </p:attrNameLst>
+                                      </p:cBhvr>
+                                      <p:to>
+                                        <p:strVal val="hidden"/>
+                                      </p:to>
+                                    </p:set>
+                                  </p:childTnLst>
+                                </p:cTn>
+                              </p:par>
+                              <p:par>
+                                <p:cTn id="7" presetID="1" presetClass="entr" presetSubtype="0" fill="hold" nodeType="withEffect">
+                                  <p:stCondLst>
+                                    <p:cond delay="0"/>
+                                  </p:stCondLst>
+                                  <p:childTnLst>
+                                    <p:set>
+                                      <p:cBhvr>
+                                        <p:cTn id="8" dur="1" fill="hold">
+                                          <p:stCondLst>
+                                            <p:cond delay="0"/>
+                                          </p:stCondLst>
+                                        </p:cTn>
+                                        <p:tgtEl>
+                                          <p:spTgt spid="2"/>
+                                        </p:tgtEl>
+                                        <p:attrNameLst>
+                                          <p:attrName>style.visibility</p:attrName>
+                                        </p:attrNameLst>
+                                      </p:cBhvr>
+                                      <p:to>
+                                        <p:strVal val="visible"/>
+                                      </p:to>
+                                    </p:set>
+                                  </p:childTnLst>
+                                </p:cTn>
+                              </p:par>
+                            </p:childTnLst>
+                          </p:cTn>
+                        </p:par>
+                      </p:childTnLst>
+                    </p:cTn>
+                  </p:par>
+                </p:childTnLst>
+              </p:cTn>
+              <p:prevCondLst>
+                <p:cond evt="onPrev" delay="0">
+                  <p:tgtEl>
+                    <p:sldTgt/>
+                  </p:tgtEl>
+                </p:cond>
+              </p:prevCondLst>
+              <p:nextCondLst>
+                <p:cond evt="onNext" delay="0">
+                  <p:tgtEl>
+                    <p:sldTgt/>
+                  </p:tgtEl>
+                </p:cond>
+              </p:nextCondLst>
+            </p:seq>
+          </p:childTnLst>
+        </p:cTn>
+      </p:par>
+    </p:tnLst>
+    <p:bldLst>
+      <p:bldP spid="12" grpId="0" animBg="1"/>
+    </p:bldLst>
+  </p:timing>
+</p:sld>
+</file>
+
+<file path=ppt/slides/slide7.xml><?xml version="1.0" encoding="utf-8"?>
+<p:sld xmlns:a="http://schemas.openxmlformats.org/drawingml/2006/main" xmlns:r="http://schemas.openxmlformats.org/officeDocument/2006/relationships" xmlns:p="http://schemas.openxmlformats.org/presentationml/2006/main">
+  <p:cSld>
+    <p:spTree>
+      <p:nvGrpSpPr>
+        <p:cNvPr id="1" name=""/>
+        <p:cNvGrpSpPr/>
+        <p:nvPr/>
+      </p:nvGrpSpPr>
+      <p:grpSpPr>
+        <a:xfrm>
+          <a:off x="0" y="0"/>
+          <a:ext cx="0" cy="0"/>
+          <a:chOff x="0" y="0"/>
+          <a:chExt cx="0" cy="0"/>
+        </a:xfrm>
+      </p:grpSpPr>
+      <p:sp>
+        <p:nvSpPr>
+          <p:cNvPr id="4" name="Titre 1"/>
+          <p:cNvSpPr txBox="1">
+            <a:spLocks/>
+          </p:cNvSpPr>
+          <p:nvPr/>
+        </p:nvSpPr>
+        <p:spPr>
+          <a:xfrm>
+            <a:off x="0" y="0"/>
+            <a:ext cx="12192000" cy="747252"/>
+          </a:xfrm>
+          <a:prstGeom prst="rect">
+            <a:avLst/>
+          </a:prstGeom>
+        </p:spPr>
+        <p:txBody>
+          <a:bodyPr vert="horz" lIns="91440" tIns="45720" rIns="91440" bIns="45720" rtlCol="0" anchor="ctr">
+            <a:normAutofit/>
+          </a:bodyPr>
+          <a:lstStyle>
+            <a:lvl1pPr algn="l" defTabSz="914400" rtl="0" eaLnBrk="1" latinLnBrk="0" hangingPunct="1">
+              <a:lnSpc>
+                <a:spcPct val="90000"/>
+              </a:lnSpc>
+              <a:spcBef>
+                <a:spcPct val="0"/>
+              </a:spcBef>
+              <a:buNone/>
+              <a:defRPr sz="4400" kern="1200">
+                <a:solidFill>
+                  <a:schemeClr val="tx1"/>
+                </a:solidFill>
+                <a:latin typeface="+mj-lt"/>
+                <a:ea typeface="+mj-ea"/>
+                <a:cs typeface="+mj-cs"/>
+              </a:defRPr>
+            </a:lvl1pPr>
+          </a:lstStyle>
+          <a:p>
+            <a:r>
+              <a:rPr lang="fr-FR" sz="3600" b="1" dirty="0" smtClean="0">
+                <a:solidFill>
+                  <a:srgbClr val="0070C0"/>
+                </a:solidFill>
+              </a:rPr>
+              <a:t>  </a:t>
+            </a:r>
+            <a:r>
+              <a:rPr lang="fr-FR" sz="3600" b="1" dirty="0" smtClean="0">
+                <a:solidFill>
+                  <a:srgbClr val="0070C0"/>
+                </a:solidFill>
+              </a:rPr>
+              <a:t>Numérisation d’un signal</a:t>
+            </a:r>
+            <a:endParaRPr lang="fr-FR" sz="3600" dirty="0">
+              <a:solidFill>
+                <a:srgbClr val="0070C0"/>
+              </a:solidFill>
+            </a:endParaRPr>
+          </a:p>
+        </p:txBody>
+      </p:sp>
+      <p:cxnSp>
+        <p:nvCxnSpPr>
+          <p:cNvPr id="5" name="Connecteur droit 4"/>
+          <p:cNvCxnSpPr/>
+          <p:nvPr/>
+        </p:nvCxnSpPr>
+        <p:spPr>
+          <a:xfrm>
+            <a:off x="220983" y="747252"/>
+            <a:ext cx="11754707" cy="0"/>
+          </a:xfrm>
+          <a:prstGeom prst="line">
+            <a:avLst/>
+          </a:prstGeom>
+          <a:ln w="76200">
+            <a:gradFill flip="none" rotWithShape="1">
+              <a:gsLst>
+                <a:gs pos="0">
+                  <a:srgbClr val="0070C0"/>
+                </a:gs>
+                <a:gs pos="100000">
+                  <a:srgbClr val="0070C0">
+                    <a:alpha val="25000"/>
+                  </a:srgbClr>
+                </a:gs>
+              </a:gsLst>
+              <a:lin ang="0" scaled="1"/>
+              <a:tileRect/>
+            </a:gradFill>
+          </a:ln>
+        </p:spPr>
+        <p:style>
+          <a:lnRef idx="1">
+            <a:schemeClr val="accent1"/>
+          </a:lnRef>
+          <a:fillRef idx="0">
+            <a:schemeClr val="accent1"/>
+          </a:fillRef>
+          <a:effectRef idx="0">
+            <a:schemeClr val="accent1"/>
+          </a:effectRef>
+          <a:fontRef idx="minor">
+            <a:schemeClr val="tx1"/>
+          </a:fontRef>
+        </p:style>
+      </p:cxnSp>
+      <p:pic>
+        <p:nvPicPr>
+          <p:cNvPr id="14" name="Image 13"/>
+          <p:cNvPicPr>
+            <a:picLocks noChangeAspect="1"/>
+          </p:cNvPicPr>
+          <p:nvPr/>
+        </p:nvPicPr>
+        <p:blipFill>
+          <a:blip r:embed="rId2" cstate="print">
+            <a:extLst>
+              <a:ext uri="{28A0092B-C50C-407E-A947-70E740481C1C}">
+                <a14:useLocalDpi xmlns:a14="http://schemas.microsoft.com/office/drawing/2010/main" val="0"/>
+              </a:ext>
+            </a:extLst>
+          </a:blip>
+          <a:stretch>
+            <a:fillRect/>
+          </a:stretch>
+        </p:blipFill>
+        <p:spPr>
+          <a:xfrm>
+            <a:off x="2172831" y="882712"/>
+            <a:ext cx="7846337" cy="5884753"/>
+          </a:xfrm>
+          <a:prstGeom prst="rect">
+            <a:avLst/>
+          </a:prstGeom>
+        </p:spPr>
+      </p:pic>
+    </p:spTree>
+    <p:extLst>
+      <p:ext uri="{BB962C8B-B14F-4D97-AF65-F5344CB8AC3E}">
+        <p14:creationId xmlns:p14="http://schemas.microsoft.com/office/powerpoint/2010/main" val="612194955"/>
+      </p:ext>
+    </p:extLst>
+  </p:cSld>
+  <p:clrMapOvr>
+    <a:masterClrMapping/>
+  </p:clrMapOvr>
+  <p:timing>
+    <p:tnLst>
+      <p:par>
+        <p:cTn id="1" dur="indefinite" restart="never" nodeType="tmRoot"/>
+      </p:par>
+    </p:tnLst>
+  </p:timing>
+</p:sld>
+</file>
+
+<file path=ppt/slides/slide8.xml><?xml version="1.0" encoding="utf-8"?>
+<p:sld xmlns:a="http://schemas.openxmlformats.org/drawingml/2006/main" xmlns:r="http://schemas.openxmlformats.org/officeDocument/2006/relationships" xmlns:p="http://schemas.openxmlformats.org/presentationml/2006/main">
+  <p:cSld>
+    <p:spTree>
+      <p:nvGrpSpPr>
+        <p:cNvPr id="1" name=""/>
+        <p:cNvGrpSpPr/>
+        <p:nvPr/>
+      </p:nvGrpSpPr>
+      <p:grpSpPr>
+        <a:xfrm>
+          <a:off x="0" y="0"/>
+          <a:ext cx="0" cy="0"/>
+          <a:chOff x="0" y="0"/>
+          <a:chExt cx="0" cy="0"/>
+        </a:xfrm>
+      </p:grpSpPr>
+      <p:pic>
+        <p:nvPicPr>
+          <p:cNvPr id="6" name="Image 5"/>
+          <p:cNvPicPr>
+            <a:picLocks noChangeAspect="1"/>
+          </p:cNvPicPr>
+          <p:nvPr/>
+        </p:nvPicPr>
+        <p:blipFill>
+          <a:blip r:embed="rId2">
+            <a:extLst>
+              <a:ext uri="{28A0092B-C50C-407E-A947-70E740481C1C}">
+                <a14:useLocalDpi xmlns:a14="http://schemas.microsoft.com/office/drawing/2010/main" val="0"/>
+              </a:ext>
+            </a:extLst>
+          </a:blip>
+          <a:stretch>
+            <a:fillRect/>
+          </a:stretch>
+        </p:blipFill>
+        <p:spPr>
+          <a:xfrm>
+            <a:off x="1330858" y="1100917"/>
+            <a:ext cx="8709434" cy="5757083"/>
+          </a:xfrm>
+          <a:prstGeom prst="rect">
+            <a:avLst/>
+          </a:prstGeom>
+        </p:spPr>
+      </p:pic>
+      <p:pic>
+        <p:nvPicPr>
+          <p:cNvPr id="7" name="Image 6"/>
+          <p:cNvPicPr>
+            <a:picLocks noChangeAspect="1"/>
+          </p:cNvPicPr>
+          <p:nvPr/>
+        </p:nvPicPr>
+        <p:blipFill>
+          <a:blip r:embed="rId3">
+            <a:extLst>
+              <a:ext uri="{28A0092B-C50C-407E-A947-70E740481C1C}">
+                <a14:useLocalDpi xmlns:a14="http://schemas.microsoft.com/office/drawing/2010/main" val="0"/>
+              </a:ext>
+            </a:extLst>
+          </a:blip>
+          <a:stretch>
+            <a:fillRect/>
+          </a:stretch>
+        </p:blipFill>
+        <p:spPr>
+          <a:xfrm>
+            <a:off x="1330858" y="1100917"/>
+            <a:ext cx="8709434" cy="5757083"/>
+          </a:xfrm>
+          <a:prstGeom prst="rect">
+            <a:avLst/>
+          </a:prstGeom>
+        </p:spPr>
+      </p:pic>
+      <p:pic>
+        <p:nvPicPr>
+          <p:cNvPr id="13" name="Image 12"/>
+          <p:cNvPicPr>
+            <a:picLocks noChangeAspect="1"/>
+          </p:cNvPicPr>
+          <p:nvPr/>
+        </p:nvPicPr>
+        <p:blipFill>
+          <a:blip r:embed="rId4">
+            <a:extLst>
+              <a:ext uri="{28A0092B-C50C-407E-A947-70E740481C1C}">
+                <a14:useLocalDpi xmlns:a14="http://schemas.microsoft.com/office/drawing/2010/main" val="0"/>
+              </a:ext>
+            </a:extLst>
+          </a:blip>
+          <a:stretch>
+            <a:fillRect/>
+          </a:stretch>
+        </p:blipFill>
+        <p:spPr>
+          <a:xfrm>
+            <a:off x="1330858" y="1100917"/>
+            <a:ext cx="8709434" cy="5757083"/>
+          </a:xfrm>
+          <a:prstGeom prst="rect">
+            <a:avLst/>
+          </a:prstGeom>
+        </p:spPr>
+      </p:pic>
+      <p:sp>
+        <p:nvSpPr>
+          <p:cNvPr id="4" name="Titre 1"/>
+          <p:cNvSpPr txBox="1">
+            <a:spLocks/>
+          </p:cNvSpPr>
+          <p:nvPr/>
+        </p:nvSpPr>
+        <p:spPr>
+          <a:xfrm>
+            <a:off x="0" y="0"/>
+            <a:ext cx="12192000" cy="747252"/>
+          </a:xfrm>
+          <a:prstGeom prst="rect">
+            <a:avLst/>
+          </a:prstGeom>
+        </p:spPr>
+        <p:txBody>
+          <a:bodyPr vert="horz" lIns="91440" tIns="45720" rIns="91440" bIns="45720" rtlCol="0" anchor="ctr">
+            <a:normAutofit/>
+          </a:bodyPr>
+          <a:lstStyle>
+            <a:lvl1pPr algn="l" defTabSz="914400" rtl="0" eaLnBrk="1" latinLnBrk="0" hangingPunct="1">
+              <a:lnSpc>
+                <a:spcPct val="90000"/>
+              </a:lnSpc>
+              <a:spcBef>
+                <a:spcPct val="0"/>
+              </a:spcBef>
+              <a:buNone/>
+              <a:defRPr sz="4400" kern="1200">
+                <a:solidFill>
+                  <a:schemeClr val="tx1"/>
+                </a:solidFill>
+                <a:latin typeface="+mj-lt"/>
+                <a:ea typeface="+mj-ea"/>
+                <a:cs typeface="+mj-cs"/>
+              </a:defRPr>
+            </a:lvl1pPr>
+          </a:lstStyle>
+          <a:p>
+            <a:r>
+              <a:rPr lang="fr-FR" sz="3600" b="1" dirty="0" smtClean="0">
+                <a:solidFill>
+                  <a:srgbClr val="0070C0"/>
+                </a:solidFill>
+              </a:rPr>
+              <a:t>  </a:t>
+            </a:r>
+            <a:r>
+              <a:rPr lang="fr-FR" sz="3600" b="1" dirty="0" smtClean="0">
+                <a:solidFill>
+                  <a:srgbClr val="0070C0"/>
+                </a:solidFill>
+              </a:rPr>
+              <a:t>Critère de Shannon</a:t>
             </a:r>
             <a:endParaRPr lang="fr-FR" sz="3600" dirty="0">
               <a:solidFill>
@@ -4666,7 +6540,7 @@
           <p:nvPr/>
         </p:nvPicPr>
         <p:blipFill>
-          <a:blip r:embed="rId6">
+          <a:blip r:embed="rId5">
             <a:extLst>
               <a:ext uri="{28A0092B-C50C-407E-A947-70E740481C1C}">
                 <a14:useLocalDpi xmlns:a14="http://schemas.microsoft.com/office/drawing/2010/main" val="0"/>
@@ -4679,197 +6553,18 @@
         </p:blipFill>
         <p:spPr>
           <a:xfrm>
-            <a:off x="0" y="1482124"/>
-            <a:ext cx="7138810" cy="4411785"/>
+            <a:off x="1330858" y="1100916"/>
+            <a:ext cx="8709434" cy="5757083"/>
           </a:xfrm>
           <a:prstGeom prst="rect">
             <a:avLst/>
           </a:prstGeom>
         </p:spPr>
       </p:pic>
-      <p:pic>
-        <p:nvPicPr>
-          <p:cNvPr id="13" name="stereo_L1right_H1left_strain10s">
-            <a:hlinkClick r:id="" action="ppaction://media"/>
-          </p:cNvPr>
-          <p:cNvPicPr>
-            <a:picLocks noChangeAspect="1"/>
-          </p:cNvPicPr>
-          <p:nvPr>
-            <a:audioFile r:link="rId2"/>
-            <p:extLst>
-              <p:ext uri="{DAA4B4D4-6D71-4841-9C94-3DE7FCFB9230}">
-                <p14:media xmlns:p14="http://schemas.microsoft.com/office/powerpoint/2010/main" r:embed="rId1"/>
-              </p:ext>
-            </p:extLst>
-          </p:nvPr>
-        </p:nvPicPr>
-        <p:blipFill>
-          <a:blip r:embed="rId7"/>
-          <a:stretch>
-            <a:fillRect/>
-          </a:stretch>
-        </p:blipFill>
-        <p:spPr>
-          <a:xfrm>
-            <a:off x="3264605" y="1177323"/>
-            <a:ext cx="609600" cy="609600"/>
-          </a:xfrm>
-          <a:prstGeom prst="rect">
-            <a:avLst/>
-          </a:prstGeom>
-        </p:spPr>
-      </p:pic>
-      <p:pic>
-        <p:nvPicPr>
-          <p:cNvPr id="14" name="GW150914_H1left_L1right_shifted-unknowntimeshift">
-            <a:hlinkClick r:id="" action="ppaction://media"/>
-          </p:cNvPr>
-          <p:cNvPicPr>
-            <a:picLocks noChangeAspect="1"/>
-          </p:cNvPicPr>
-          <p:nvPr>
-            <a:audioFile r:link="rId4"/>
-            <p:extLst>
-              <p:ext uri="{DAA4B4D4-6D71-4841-9C94-3DE7FCFB9230}">
-                <p14:media xmlns:p14="http://schemas.microsoft.com/office/powerpoint/2010/main" r:embed="rId3"/>
-              </p:ext>
-            </p:extLst>
-          </p:nvPr>
-        </p:nvPicPr>
-        <p:blipFill>
-          <a:blip r:embed="rId7"/>
-          <a:stretch>
-            <a:fillRect/>
-          </a:stretch>
-        </p:blipFill>
-        <p:spPr>
-          <a:xfrm>
-            <a:off x="9047648" y="1177323"/>
-            <a:ext cx="609600" cy="609600"/>
-          </a:xfrm>
-          <a:prstGeom prst="rect">
-            <a:avLst/>
-          </a:prstGeom>
-        </p:spPr>
-      </p:pic>
-      <p:pic>
-        <p:nvPicPr>
-          <p:cNvPr id="15" name="Image 14"/>
-          <p:cNvPicPr>
-            <a:picLocks noChangeAspect="1"/>
-          </p:cNvPicPr>
-          <p:nvPr/>
-        </p:nvPicPr>
-        <p:blipFill rotWithShape="1">
-          <a:blip r:embed="rId8"/>
-          <a:srcRect l="41867" t="18228" r="37246" b="63375"/>
-          <a:stretch/>
-        </p:blipFill>
-        <p:spPr>
-          <a:xfrm>
-            <a:off x="6817696" y="2432163"/>
-            <a:ext cx="5069504" cy="2511706"/>
-          </a:xfrm>
-          <a:prstGeom prst="rect">
-            <a:avLst/>
-          </a:prstGeom>
-        </p:spPr>
-      </p:pic>
-      <p:pic>
-        <p:nvPicPr>
-          <p:cNvPr id="16" name="Image 15"/>
-          <p:cNvPicPr>
-            <a:picLocks noChangeAspect="1"/>
-          </p:cNvPicPr>
-          <p:nvPr/>
-        </p:nvPicPr>
-        <p:blipFill rotWithShape="1">
-          <a:blip r:embed="rId8"/>
-          <a:srcRect l="41867" t="81941" r="37246" b="12010"/>
-          <a:stretch/>
-        </p:blipFill>
-        <p:spPr>
-          <a:xfrm>
-            <a:off x="6817696" y="4943869"/>
-            <a:ext cx="5069504" cy="825908"/>
-          </a:xfrm>
-          <a:prstGeom prst="rect">
-            <a:avLst/>
-          </a:prstGeom>
-        </p:spPr>
-      </p:pic>
-      <p:sp>
-        <p:nvSpPr>
-          <p:cNvPr id="17" name="ZoneTexte 16"/>
-          <p:cNvSpPr txBox="1"/>
-          <p:nvPr/>
-        </p:nvSpPr>
-        <p:spPr>
-          <a:xfrm>
-            <a:off x="10261343" y="6488668"/>
-            <a:ext cx="1930657" cy="369332"/>
-          </a:xfrm>
-          <a:prstGeom prst="rect">
-            <a:avLst/>
-          </a:prstGeom>
-          <a:noFill/>
-        </p:spPr>
-        <p:txBody>
-          <a:bodyPr wrap="none" rtlCol="0">
-            <a:spAutoFit/>
-          </a:bodyPr>
-          <a:lstStyle/>
-          <a:p>
-            <a:r>
-              <a:rPr lang="fr-FR" dirty="0" smtClean="0"/>
-              <a:t>Abbott et al., 2016</a:t>
-            </a:r>
-            <a:endParaRPr lang="fr-FR" dirty="0"/>
-          </a:p>
-        </p:txBody>
-      </p:sp>
-      <p:sp>
-        <p:nvSpPr>
-          <p:cNvPr id="18" name="Rectangle 17"/>
-          <p:cNvSpPr/>
-          <p:nvPr/>
-        </p:nvSpPr>
-        <p:spPr>
-          <a:xfrm>
-            <a:off x="2205408" y="6488668"/>
-            <a:ext cx="4612288" cy="369332"/>
-          </a:xfrm>
-          <a:prstGeom prst="rect">
-            <a:avLst/>
-          </a:prstGeom>
-        </p:spPr>
-        <p:txBody>
-          <a:bodyPr wrap="none">
-            <a:spAutoFit/>
-          </a:bodyPr>
-          <a:lstStyle/>
-          <a:p>
-            <a:r>
-              <a:rPr lang="fr-FR" dirty="0">
-                <a:hlinkClick r:id="rId9"/>
-              </a:rPr>
-              <a:t>https://www.gw-openscience.org/o2speclines</a:t>
-            </a:r>
-            <a:r>
-              <a:rPr lang="fr-FR" dirty="0" smtClean="0">
-                <a:hlinkClick r:id="rId9"/>
-              </a:rPr>
-              <a:t>/</a:t>
-            </a:r>
-            <a:endParaRPr lang="fr-FR" dirty="0" smtClean="0"/>
-          </a:p>
-        </p:txBody>
-      </p:sp>
     </p:spTree>
     <p:extLst>
       <p:ext uri="{BB962C8B-B14F-4D97-AF65-F5344CB8AC3E}">
-        <p14:creationId xmlns:p14="http://schemas.microsoft.com/office/powerpoint/2010/main" val="1739515517"/>
+        <p14:creationId xmlns:p14="http://schemas.microsoft.com/office/powerpoint/2010/main" val="802050484"/>
       </p:ext>
     </p:extLst>
   </p:cSld>
@@ -4910,7 +6605,7 @@
                                           </p:stCondLst>
                                         </p:cTn>
                                         <p:tgtEl>
-                                          <p:spTgt spid="15"/>
+                                          <p:spTgt spid="7"/>
                                         </p:tgtEl>
                                         <p:attrNameLst>
                                           <p:attrName>style.visibility</p:attrName>
@@ -4923,21 +6618,39 @@
                                   </p:childTnLst>
                                 </p:cTn>
                               </p:par>
+                            </p:childTnLst>
+                          </p:cTn>
+                        </p:par>
+                      </p:childTnLst>
+                    </p:cTn>
+                  </p:par>
+                  <p:par>
+                    <p:cTn id="7" fill="hold">
+                      <p:stCondLst>
+                        <p:cond delay="indefinite"/>
+                      </p:stCondLst>
+                      <p:childTnLst>
+                        <p:par>
+                          <p:cTn id="8" fill="hold">
+                            <p:stCondLst>
+                              <p:cond delay="0"/>
+                            </p:stCondLst>
+                            <p:childTnLst>
                               <p:par>
-                                <p:cTn id="7" presetID="1" presetClass="entr" presetSubtype="0" fill="hold" nodeType="withEffect">
+                                <p:cTn id="9" presetID="1" presetClass="entr" presetSubtype="0" fill="hold" nodeType="clickEffect">
                                   <p:stCondLst>
                                     <p:cond delay="0"/>
                                   </p:stCondLst>
                                   <p:childTnLst>
                                     <p:set>
                                       <p:cBhvr>
-                                        <p:cTn id="8" dur="1" fill="hold">
+                                        <p:cTn id="10" dur="1" fill="hold">
                                           <p:stCondLst>
                                             <p:cond delay="0"/>
                                           </p:stCondLst>
                                         </p:cTn>
                                         <p:tgtEl>
-                                          <p:spTgt spid="16"/>
+                                          <p:spTgt spid="13"/>
                                         </p:tgtEl>
                                         <p:attrNameLst>
                                           <p:attrName>style.visibility</p:attrName>
@@ -4950,21 +6663,39 @@
                                   </p:childTnLst>
                                 </p:cTn>
                               </p:par>
+                            </p:childTnLst>
+                          </p:cTn>
+                        </p:par>
+                      </p:childTnLst>
+                    </p:cTn>
+                  </p:par>
+                  <p:par>
+                    <p:cTn id="11" fill="hold">
+                      <p:stCondLst>
+                        <p:cond delay="indefinite"/>
+                      </p:stCondLst>
+                      <p:childTnLst>
+                        <p:par>
+                          <p:cTn id="12" fill="hold">
+                            <p:stCondLst>
+                              <p:cond delay="0"/>
+                            </p:stCondLst>
+                            <p:childTnLst>
                               <p:par>
-                                <p:cTn id="9" presetID="1" presetClass="entr" presetSubtype="0" fill="hold" nodeType="withEffect">
+                                <p:cTn id="13" presetID="1" presetClass="entr" presetSubtype="0" fill="hold" nodeType="clickEffect">
                                   <p:stCondLst>
                                     <p:cond delay="0"/>
                                   </p:stCondLst>
                                   <p:childTnLst>
                                     <p:set>
                                       <p:cBhvr>
-                                        <p:cTn id="10" dur="1" fill="hold">
+                                        <p:cTn id="14" dur="1" fill="hold">
                                           <p:stCondLst>
                                             <p:cond delay="0"/>
                                           </p:stCondLst>
                                         </p:cTn>
                                         <p:tgtEl>
-                                          <p:spTgt spid="14"/>
+                                          <p:spTgt spid="3"/>
                                         </p:tgtEl>
                                         <p:attrNameLst>
                                           <p:attrName>style.visibility</p:attrName>
@@ -5000,46 +6731,466 @@
                 </p:cond>
               </p:nextCondLst>
             </p:seq>
-            <p:audio>
-              <p:cMediaNode vol="80000">
-                <p:cTn id="11" fill="hold" display="0">
-                  <p:stCondLst>
-                    <p:cond delay="indefinite"/>
-                  </p:stCondLst>
-                  <p:endCondLst>
-                    <p:cond evt="onStopAudio" delay="0">
-                      <p:tgtEl>
-                        <p:sldTgt/>
-                      </p:tgtEl>
-                    </p:cond>
-                  </p:endCondLst>
-                </p:cTn>
-                <p:tgtEl>
-                  <p:spTgt spid="13"/>
-                </p:tgtEl>
-              </p:cMediaNode>
-            </p:audio>
-            <p:audio>
-              <p:cMediaNode vol="80000">
-                <p:cTn id="12" fill="hold" display="0">
-                  <p:stCondLst>
-                    <p:cond delay="indefinite"/>
-                  </p:stCondLst>
-                  <p:endCondLst>
-                    <p:cond evt="onStopAudio" delay="0">
-                      <p:tgtEl>
-                        <p:sldTgt/>
-                      </p:tgtEl>
-                    </p:cond>
-                  </p:endCondLst>
-                </p:cTn>
-                <p:tgtEl>
-                  <p:spTgt spid="14"/>
-                </p:tgtEl>
-              </p:cMediaNode>
-            </p:audio>
           </p:childTnLst>
         </p:cTn>
+      </p:par>
+    </p:tnLst>
+  </p:timing>
+</p:sld>
+</file>
+
+<file path=ppt/slides/slide9.xml><?xml version="1.0" encoding="utf-8"?>
+<p:sld xmlns:a="http://schemas.openxmlformats.org/drawingml/2006/main" xmlns:r="http://schemas.openxmlformats.org/officeDocument/2006/relationships" xmlns:p="http://schemas.openxmlformats.org/presentationml/2006/main">
+  <p:cSld>
+    <p:spTree>
+      <p:nvGrpSpPr>
+        <p:cNvPr id="1" name=""/>
+        <p:cNvGrpSpPr/>
+        <p:nvPr/>
+      </p:nvGrpSpPr>
+      <p:grpSpPr>
+        <a:xfrm>
+          <a:off x="0" y="0"/>
+          <a:ext cx="0" cy="0"/>
+          <a:chOff x="0" y="0"/>
+          <a:chExt cx="0" cy="0"/>
+        </a:xfrm>
+      </p:grpSpPr>
+      <p:sp>
+        <p:nvSpPr>
+          <p:cNvPr id="4" name="Titre 1"/>
+          <p:cNvSpPr txBox="1">
+            <a:spLocks/>
+          </p:cNvSpPr>
+          <p:nvPr/>
+        </p:nvSpPr>
+        <p:spPr>
+          <a:xfrm>
+            <a:off x="0" y="0"/>
+            <a:ext cx="12192000" cy="747252"/>
+          </a:xfrm>
+          <a:prstGeom prst="rect">
+            <a:avLst/>
+          </a:prstGeom>
+        </p:spPr>
+        <p:txBody>
+          <a:bodyPr vert="horz" lIns="91440" tIns="45720" rIns="91440" bIns="45720" rtlCol="0" anchor="ctr">
+            <a:normAutofit/>
+          </a:bodyPr>
+          <a:lstStyle>
+            <a:lvl1pPr algn="l" defTabSz="914400" rtl="0" eaLnBrk="1" latinLnBrk="0" hangingPunct="1">
+              <a:lnSpc>
+                <a:spcPct val="90000"/>
+              </a:lnSpc>
+              <a:spcBef>
+                <a:spcPct val="0"/>
+              </a:spcBef>
+              <a:buNone/>
+              <a:defRPr sz="4400" kern="1200">
+                <a:solidFill>
+                  <a:schemeClr val="tx1"/>
+                </a:solidFill>
+                <a:latin typeface="+mj-lt"/>
+                <a:ea typeface="+mj-ea"/>
+                <a:cs typeface="+mj-cs"/>
+              </a:defRPr>
+            </a:lvl1pPr>
+          </a:lstStyle>
+          <a:p>
+            <a:r>
+              <a:rPr lang="fr-FR" sz="3600" b="1" dirty="0" smtClean="0">
+                <a:solidFill>
+                  <a:srgbClr val="0070C0"/>
+                </a:solidFill>
+              </a:rPr>
+              <a:t>  </a:t>
+            </a:r>
+            <a:r>
+              <a:rPr lang="fr-FR" sz="3600" b="1" dirty="0" smtClean="0">
+                <a:solidFill>
+                  <a:srgbClr val="0070C0"/>
+                </a:solidFill>
+              </a:rPr>
+              <a:t>Filtrage numérique</a:t>
+            </a:r>
+            <a:endParaRPr lang="fr-FR" sz="3600" dirty="0">
+              <a:solidFill>
+                <a:srgbClr val="0070C0"/>
+              </a:solidFill>
+            </a:endParaRPr>
+          </a:p>
+        </p:txBody>
+      </p:sp>
+      <p:cxnSp>
+        <p:nvCxnSpPr>
+          <p:cNvPr id="5" name="Connecteur droit 4"/>
+          <p:cNvCxnSpPr/>
+          <p:nvPr/>
+        </p:nvCxnSpPr>
+        <p:spPr>
+          <a:xfrm>
+            <a:off x="220983" y="747252"/>
+            <a:ext cx="11754707" cy="0"/>
+          </a:xfrm>
+          <a:prstGeom prst="line">
+            <a:avLst/>
+          </a:prstGeom>
+          <a:ln w="76200">
+            <a:gradFill flip="none" rotWithShape="1">
+              <a:gsLst>
+                <a:gs pos="0">
+                  <a:srgbClr val="0070C0"/>
+                </a:gs>
+                <a:gs pos="100000">
+                  <a:srgbClr val="0070C0">
+                    <a:alpha val="25000"/>
+                  </a:srgbClr>
+                </a:gs>
+              </a:gsLst>
+              <a:lin ang="0" scaled="1"/>
+              <a:tileRect/>
+            </a:gradFill>
+          </a:ln>
+        </p:spPr>
+        <p:style>
+          <a:lnRef idx="1">
+            <a:schemeClr val="accent1"/>
+          </a:lnRef>
+          <a:fillRef idx="0">
+            <a:schemeClr val="accent1"/>
+          </a:fillRef>
+          <a:effectRef idx="0">
+            <a:schemeClr val="accent1"/>
+          </a:effectRef>
+          <a:fontRef idx="minor">
+            <a:schemeClr val="tx1"/>
+          </a:fontRef>
+        </p:style>
+      </p:cxnSp>
+      <p:pic>
+        <p:nvPicPr>
+          <p:cNvPr id="8" name="Image 7"/>
+          <p:cNvPicPr>
+            <a:picLocks noChangeAspect="1"/>
+          </p:cNvPicPr>
+          <p:nvPr/>
+        </p:nvPicPr>
+        <p:blipFill>
+          <a:blip r:embed="rId2">
+            <a:extLst>
+              <a:ext uri="{28A0092B-C50C-407E-A947-70E740481C1C}">
+                <a14:useLocalDpi xmlns:a14="http://schemas.microsoft.com/office/drawing/2010/main" val="0"/>
+              </a:ext>
+            </a:extLst>
+          </a:blip>
+          <a:stretch>
+            <a:fillRect/>
+          </a:stretch>
+        </p:blipFill>
+        <p:spPr>
+          <a:xfrm>
+            <a:off x="3337" y="2068718"/>
+            <a:ext cx="12188663" cy="4789282"/>
+          </a:xfrm>
+          <a:prstGeom prst="rect">
+            <a:avLst/>
+          </a:prstGeom>
+        </p:spPr>
+      </p:pic>
+      <mc:AlternateContent xmlns:mc="http://schemas.openxmlformats.org/markup-compatibility/2006">
+        <mc:Choice xmlns:a14="http://schemas.microsoft.com/office/drawing/2010/main" Requires="a14">
+          <p:sp>
+            <p:nvSpPr>
+              <p:cNvPr id="11" name="ZoneTexte 10"/>
+              <p:cNvSpPr txBox="1"/>
+              <p:nvPr/>
+            </p:nvSpPr>
+            <p:spPr>
+              <a:xfrm>
+                <a:off x="5107940" y="1208111"/>
+                <a:ext cx="1976118" cy="572786"/>
+              </a:xfrm>
+              <a:prstGeom prst="rect">
+                <a:avLst/>
+              </a:prstGeom>
+              <a:noFill/>
+            </p:spPr>
+            <p:txBody>
+              <a:bodyPr wrap="none" lIns="0" tIns="0" rIns="0" bIns="0" rtlCol="0">
+                <a:spAutoFit/>
+              </a:bodyPr>
+              <a:lstStyle/>
+              <a:p>
+                <a:pPr/>
+                <a14:m>
+                  <m:oMathPara xmlns:m="http://schemas.openxmlformats.org/officeDocument/2006/math">
+                    <m:oMathParaPr>
+                      <m:jc m:val="centerGroup"/>
+                    </m:oMathParaPr>
+                    <m:oMath xmlns:m="http://schemas.openxmlformats.org/officeDocument/2006/math">
+                      <m:f>
+                        <m:fPr>
+                          <m:ctrlPr>
+                            <a:rPr lang="fr-FR" b="0" i="1" smtClean="0">
+                              <a:solidFill>
+                                <a:schemeClr val="accent1"/>
+                              </a:solidFill>
+                              <a:latin typeface="Cambria Math" panose="02040503050406030204" pitchFamily="18" charset="0"/>
+                            </a:rPr>
+                          </m:ctrlPr>
+                        </m:fPr>
+                        <m:num>
+                          <m:r>
+                            <a:rPr lang="fr-FR" b="0" i="1" smtClean="0">
+                              <a:solidFill>
+                                <a:schemeClr val="accent1"/>
+                              </a:solidFill>
+                              <a:latin typeface="Cambria Math" panose="02040503050406030204" pitchFamily="18" charset="0"/>
+                            </a:rPr>
+                            <m:t>1</m:t>
+                          </m:r>
+                        </m:num>
+                        <m:den>
+                          <m:sSub>
+                            <m:sSubPr>
+                              <m:ctrlPr>
+                                <a:rPr lang="fr-FR" i="1">
+                                  <a:solidFill>
+                                    <a:schemeClr val="accent1"/>
+                                  </a:solidFill>
+                                  <a:latin typeface="Cambria Math" panose="02040503050406030204" pitchFamily="18" charset="0"/>
+                                </a:rPr>
+                              </m:ctrlPr>
+                            </m:sSubPr>
+                            <m:e>
+                              <m:r>
+                                <a:rPr lang="fr-FR" i="1">
+                                  <a:solidFill>
+                                    <a:schemeClr val="accent1"/>
+                                  </a:solidFill>
+                                  <a:latin typeface="Cambria Math" panose="02040503050406030204" pitchFamily="18" charset="0"/>
+                                </a:rPr>
+                                <m:t>𝜔</m:t>
+                              </m:r>
+                            </m:e>
+                            <m:sub>
+                              <m:r>
+                                <a:rPr lang="fr-FR" i="1">
+                                  <a:solidFill>
+                                    <a:schemeClr val="accent1"/>
+                                  </a:solidFill>
+                                  <a:latin typeface="Cambria Math" panose="02040503050406030204" pitchFamily="18" charset="0"/>
+                                </a:rPr>
+                                <m:t>𝑐</m:t>
+                              </m:r>
+                            </m:sub>
+                          </m:sSub>
+                        </m:den>
+                      </m:f>
+                      <m:f>
+                        <m:fPr>
+                          <m:ctrlPr>
+                            <a:rPr lang="fr-FR" b="0" i="1" smtClean="0">
+                              <a:solidFill>
+                                <a:schemeClr val="accent1"/>
+                              </a:solidFill>
+                              <a:latin typeface="Cambria Math" panose="02040503050406030204" pitchFamily="18" charset="0"/>
+                            </a:rPr>
+                          </m:ctrlPr>
+                        </m:fPr>
+                        <m:num>
+                          <m:r>
+                            <m:rPr>
+                              <m:sty m:val="p"/>
+                            </m:rPr>
+                            <a:rPr lang="fr-FR" b="0" i="0" smtClean="0">
+                              <a:solidFill>
+                                <a:schemeClr val="accent1"/>
+                              </a:solidFill>
+                              <a:latin typeface="Cambria Math" panose="02040503050406030204" pitchFamily="18" charset="0"/>
+                            </a:rPr>
+                            <m:t>d</m:t>
+                          </m:r>
+                          <m:r>
+                            <a:rPr lang="fr-FR" b="0" i="1" smtClean="0">
+                              <a:solidFill>
+                                <a:schemeClr val="accent1"/>
+                              </a:solidFill>
+                              <a:latin typeface="Cambria Math" panose="02040503050406030204" pitchFamily="18" charset="0"/>
+                            </a:rPr>
+                            <m:t>𝑠</m:t>
+                          </m:r>
+                        </m:num>
+                        <m:den>
+                          <m:r>
+                            <m:rPr>
+                              <m:sty m:val="p"/>
+                            </m:rPr>
+                            <a:rPr lang="fr-FR" b="0" i="0" smtClean="0">
+                              <a:solidFill>
+                                <a:schemeClr val="accent1"/>
+                              </a:solidFill>
+                              <a:latin typeface="Cambria Math" panose="02040503050406030204" pitchFamily="18" charset="0"/>
+                            </a:rPr>
+                            <m:t>d</m:t>
+                          </m:r>
+                          <m:r>
+                            <a:rPr lang="fr-FR" b="0" i="1" smtClean="0">
+                              <a:solidFill>
+                                <a:schemeClr val="accent1"/>
+                              </a:solidFill>
+                              <a:latin typeface="Cambria Math" panose="02040503050406030204" pitchFamily="18" charset="0"/>
+                            </a:rPr>
+                            <m:t>𝑡</m:t>
+                          </m:r>
+                        </m:den>
+                      </m:f>
+                      <m:r>
+                        <a:rPr lang="fr-FR" b="0" i="1" smtClean="0">
+                          <a:solidFill>
+                            <a:schemeClr val="accent1"/>
+                          </a:solidFill>
+                          <a:latin typeface="Cambria Math" panose="02040503050406030204" pitchFamily="18" charset="0"/>
+                        </a:rPr>
+                        <m:t>+</m:t>
+                      </m:r>
+                      <m:r>
+                        <a:rPr lang="fr-FR" b="0" i="1" smtClean="0">
+                          <a:solidFill>
+                            <a:schemeClr val="accent1"/>
+                          </a:solidFill>
+                          <a:latin typeface="Cambria Math" panose="02040503050406030204" pitchFamily="18" charset="0"/>
+                        </a:rPr>
+                        <m:t>𝑠</m:t>
+                      </m:r>
+                      <m:r>
+                        <a:rPr lang="fr-FR" b="0" i="1" smtClean="0">
+                          <a:solidFill>
+                            <a:schemeClr val="accent1"/>
+                          </a:solidFill>
+                          <a:latin typeface="Cambria Math" panose="02040503050406030204" pitchFamily="18" charset="0"/>
+                        </a:rPr>
+                        <m:t>(</m:t>
+                      </m:r>
+                      <m:r>
+                        <a:rPr lang="fr-FR" b="0" i="1" smtClean="0">
+                          <a:solidFill>
+                            <a:schemeClr val="accent1"/>
+                          </a:solidFill>
+                          <a:latin typeface="Cambria Math" panose="02040503050406030204" pitchFamily="18" charset="0"/>
+                        </a:rPr>
+                        <m:t>𝑡</m:t>
+                      </m:r>
+                      <m:r>
+                        <a:rPr lang="fr-FR" b="0" i="1" smtClean="0">
+                          <a:solidFill>
+                            <a:schemeClr val="accent1"/>
+                          </a:solidFill>
+                          <a:latin typeface="Cambria Math" panose="02040503050406030204" pitchFamily="18" charset="0"/>
+                        </a:rPr>
+                        <m:t>)=</m:t>
+                      </m:r>
+                      <m:r>
+                        <a:rPr lang="fr-FR" b="0" i="1" smtClean="0">
+                          <a:solidFill>
+                            <a:schemeClr val="accent1"/>
+                          </a:solidFill>
+                          <a:latin typeface="Cambria Math" panose="02040503050406030204" pitchFamily="18" charset="0"/>
+                        </a:rPr>
+                        <m:t>𝑒</m:t>
+                      </m:r>
+                      <m:r>
+                        <a:rPr lang="fr-FR" b="0" i="1" smtClean="0">
+                          <a:solidFill>
+                            <a:schemeClr val="accent1"/>
+                          </a:solidFill>
+                          <a:latin typeface="Cambria Math" panose="02040503050406030204" pitchFamily="18" charset="0"/>
+                        </a:rPr>
+                        <m:t>(</m:t>
+                      </m:r>
+                      <m:r>
+                        <a:rPr lang="fr-FR" b="0" i="1" smtClean="0">
+                          <a:solidFill>
+                            <a:schemeClr val="accent1"/>
+                          </a:solidFill>
+                          <a:latin typeface="Cambria Math" panose="02040503050406030204" pitchFamily="18" charset="0"/>
+                        </a:rPr>
+                        <m:t>𝑡</m:t>
+                      </m:r>
+                      <m:r>
+                        <a:rPr lang="fr-FR" b="0" i="1" smtClean="0">
+                          <a:solidFill>
+                            <a:schemeClr val="accent1"/>
+                          </a:solidFill>
+                          <a:latin typeface="Cambria Math" panose="02040503050406030204" pitchFamily="18" charset="0"/>
+                        </a:rPr>
+                        <m:t>)</m:t>
+                      </m:r>
+                    </m:oMath>
+                  </m:oMathPara>
+                </a14:m>
+                <a:endParaRPr lang="fr-FR" dirty="0">
+                  <a:solidFill>
+                    <a:schemeClr val="accent1"/>
+                  </a:solidFill>
+                </a:endParaRPr>
+              </a:p>
+            </p:txBody>
+          </p:sp>
+        </mc:Choice>
+        <mc:Fallback>
+          <p:sp>
+            <p:nvSpPr>
+              <p:cNvPr id="11" name="ZoneTexte 10"/>
+              <p:cNvSpPr txBox="1">
+                <a:spLocks noRot="1" noChangeAspect="1" noMove="1" noResize="1" noEditPoints="1" noAdjustHandles="1" noChangeArrowheads="1" noChangeShapeType="1" noTextEdit="1"/>
+              </p:cNvSpPr>
+              <p:nvPr/>
+            </p:nvSpPr>
+            <p:spPr>
+              <a:xfrm>
+                <a:off x="5107940" y="1208111"/>
+                <a:ext cx="1976118" cy="572786"/>
+              </a:xfrm>
+              <a:prstGeom prst="rect">
+                <a:avLst/>
+              </a:prstGeom>
+              <a:blipFill rotWithShape="0">
+                <a:blip r:embed="rId3"/>
+                <a:stretch>
+                  <a:fillRect/>
+                </a:stretch>
+              </a:blipFill>
+            </p:spPr>
+            <p:txBody>
+              <a:bodyPr/>
+              <a:lstStyle/>
+              <a:p>
+                <a:r>
+                  <a:rPr lang="fr-FR">
+                    <a:noFill/>
+                  </a:rPr>
+                  <a:t> </a:t>
+                </a:r>
+              </a:p>
+            </p:txBody>
+          </p:sp>
+        </mc:Fallback>
+      </mc:AlternateContent>
+    </p:spTree>
+    <p:extLst>
+      <p:ext uri="{BB962C8B-B14F-4D97-AF65-F5344CB8AC3E}">
+        <p14:creationId xmlns:p14="http://schemas.microsoft.com/office/powerpoint/2010/main" val="3920255609"/>
+      </p:ext>
+    </p:extLst>
+  </p:cSld>
+  <p:clrMapOvr>
+    <a:masterClrMapping/>
+  </p:clrMapOvr>
+  <p:timing>
+    <p:tnLst>
+      <p:par>
+        <p:cTn id="1" dur="indefinite" restart="never" nodeType="tmRoot"/>
       </p:par>
     </p:tnLst>
   </p:timing>

</xml_diff>